<commit_message>
Add About Me page to slide deck
</commit_message>
<xml_diff>
--- a/src/Stop manually publishing your PowerShell modules.pptx
+++ b/src/Stop manually publishing your PowerShell modules.pptx
@@ -5,12 +5,16 @@
     <p:sldMasterId id="2147483648" r:id="rId1"/>
   </p:sldMasterIdLst>
   <p:notesMasterIdLst>
-    <p:notesMasterId r:id="rId5"/>
+    <p:notesMasterId r:id="rId9"/>
   </p:notesMasterIdLst>
   <p:sldIdLst>
     <p:sldId id="256" r:id="rId2"/>
     <p:sldId id="271" r:id="rId3"/>
-    <p:sldId id="270" r:id="rId4"/>
+    <p:sldId id="272" r:id="rId4"/>
+    <p:sldId id="274" r:id="rId5"/>
+    <p:sldId id="275" r:id="rId6"/>
+    <p:sldId id="270" r:id="rId7"/>
+    <p:sldId id="273" r:id="rId8"/>
   </p:sldIdLst>
   <p:sldSz cx="12192000" cy="6858000"/>
   <p:notesSz cx="6858000" cy="9144000"/>
@@ -1285,7 +1289,7 @@
           <a:p>
             <a:fld id="{71DD7AA7-6947-46DE-8F8D-972DE75C4888}" type="datetimeFigureOut">
               <a:rPr lang="en-US" smtClean="0"/>
-              <a:t>1/25/2024</a:t>
+              <a:t>3/2/2024</a:t>
             </a:fld>
             <a:endParaRPr lang="en-US"/>
           </a:p>
@@ -1627,6 +1631,144 @@
     <p:extLst>
       <p:ext uri="{BB962C8B-B14F-4D97-AF65-F5344CB8AC3E}">
         <p14:creationId xmlns:p14="http://schemas.microsoft.com/office/powerpoint/2010/main" val="4186294174"/>
+      </p:ext>
+    </p:extLst>
+  </p:cSld>
+  <p:clrMapOvr>
+    <a:masterClrMapping/>
+  </p:clrMapOvr>
+</p:notes>
+</file>
+
+<file path=ppt/notesSlides/notesSlide2.xml><?xml version="1.0" encoding="utf-8"?>
+<p:notes xmlns:a="http://schemas.openxmlformats.org/drawingml/2006/main" xmlns:r="http://schemas.openxmlformats.org/officeDocument/2006/relationships" xmlns:p="http://schemas.openxmlformats.org/presentationml/2006/main">
+  <p:cSld>
+    <p:spTree>
+      <p:nvGrpSpPr>
+        <p:cNvPr id="1" name=""/>
+        <p:cNvGrpSpPr/>
+        <p:nvPr/>
+      </p:nvGrpSpPr>
+      <p:grpSpPr>
+        <a:xfrm>
+          <a:off x="0" y="0"/>
+          <a:ext cx="0" cy="0"/>
+          <a:chOff x="0" y="0"/>
+          <a:chExt cx="0" cy="0"/>
+        </a:xfrm>
+      </p:grpSpPr>
+      <p:sp>
+        <p:nvSpPr>
+          <p:cNvPr id="2" name="Slide Image Placeholder 1"/>
+          <p:cNvSpPr>
+            <a:spLocks noGrp="1" noRot="1" noChangeAspect="1"/>
+          </p:cNvSpPr>
+          <p:nvPr>
+            <p:ph type="sldImg"/>
+          </p:nvPr>
+        </p:nvSpPr>
+        <p:spPr/>
+      </p:sp>
+      <p:sp>
+        <p:nvSpPr>
+          <p:cNvPr id="3" name="Notes Placeholder 2"/>
+          <p:cNvSpPr>
+            <a:spLocks noGrp="1"/>
+          </p:cNvSpPr>
+          <p:nvPr>
+            <p:ph type="body" idx="1"/>
+          </p:nvPr>
+        </p:nvSpPr>
+        <p:spPr/>
+        <p:txBody>
+          <a:bodyPr/>
+          <a:lstStyle/>
+          <a:p>
+            <a:pPr marL="0" marR="0" lvl="0" indent="0" algn="l" defTabSz="914400" rtl="0" eaLnBrk="1" fontAlgn="auto" latinLnBrk="0" hangingPunct="1">
+              <a:lnSpc>
+                <a:spcPct val="100000"/>
+              </a:lnSpc>
+              <a:spcBef>
+                <a:spcPts val="0"/>
+              </a:spcBef>
+              <a:spcAft>
+                <a:spcPts val="0"/>
+              </a:spcAft>
+              <a:buClrTx/>
+              <a:buSzTx/>
+              <a:buFontTx/>
+              <a:buNone/>
+              <a:tabLst/>
+              <a:defRPr/>
+            </a:pPr>
+            <a:r>
+              <a:rPr lang="en-US" dirty="0"/>
+              <a:t>- @deadlydog</a:t>
+            </a:r>
+          </a:p>
+          <a:p>
+            <a:r>
+              <a:rPr lang="en-US" dirty="0"/>
+              <a:t>- Individual Contributor at iQmetrix</a:t>
+            </a:r>
+          </a:p>
+          <a:p>
+            <a:r>
+              <a:rPr lang="en-US" dirty="0"/>
+              <a:t>- Writing software for over 2 decades</a:t>
+            </a:r>
+          </a:p>
+          <a:p>
+            <a:r>
+              <a:rPr lang="en-US" dirty="0"/>
+              <a:t>- Blogging for over a decade: </a:t>
+            </a:r>
+            <a:r>
+              <a:rPr lang="en-US" dirty="0">
+                <a:hlinkClick r:id="rId3"/>
+              </a:rPr>
+              <a:t>https://blog.danskingdom.com</a:t>
+            </a:r>
+            <a:r>
+              <a:rPr lang="en-US" dirty="0"/>
+              <a:t> </a:t>
+            </a:r>
+          </a:p>
+          <a:p>
+            <a:r>
+              <a:rPr lang="en-US" dirty="0"/>
+              <a:t>- Passionate about automation and developer productivity tools</a:t>
+            </a:r>
+          </a:p>
+        </p:txBody>
+      </p:sp>
+      <p:sp>
+        <p:nvSpPr>
+          <p:cNvPr id="4" name="Slide Number Placeholder 3"/>
+          <p:cNvSpPr>
+            <a:spLocks noGrp="1"/>
+          </p:cNvSpPr>
+          <p:nvPr>
+            <p:ph type="sldNum" sz="quarter" idx="5"/>
+          </p:nvPr>
+        </p:nvSpPr>
+        <p:spPr/>
+        <p:txBody>
+          <a:bodyPr/>
+          <a:lstStyle/>
+          <a:p>
+            <a:fld id="{86D6F596-DFBB-42B8-ADCC-5FC29CF5B495}" type="slidenum">
+              <a:rPr lang="en-US" smtClean="0"/>
+              <a:t>3</a:t>
+            </a:fld>
+            <a:endParaRPr lang="en-US"/>
+          </a:p>
+        </p:txBody>
+      </p:sp>
+    </p:spTree>
+    <p:extLst>
+      <p:ext uri="{BB962C8B-B14F-4D97-AF65-F5344CB8AC3E}">
+        <p14:creationId xmlns:p14="http://schemas.microsoft.com/office/powerpoint/2010/main" val="2226918087"/>
       </p:ext>
     </p:extLst>
   </p:cSld>
@@ -16059,8 +16201,8 @@
         </p:nvSpPr>
         <p:spPr>
           <a:xfrm>
-            <a:off x="196647" y="1402445"/>
-            <a:ext cx="11798708" cy="1631216"/>
+            <a:off x="196646" y="1129334"/>
+            <a:ext cx="11798708" cy="2308324"/>
           </a:xfrm>
           <a:prstGeom prst="rect">
             <a:avLst/>
@@ -16079,34 +16221,31 @@
               </a:tabLst>
             </a:pPr>
             <a:r>
-              <a:rPr lang="en-US" sz="10000" b="1" dirty="0">
+              <a:rPr lang="en-US" sz="7200" b="1" dirty="0">
                 <a:solidFill>
                   <a:schemeClr val="bg1"/>
                 </a:solidFill>
                 <a:latin typeface="Space Grotesk" pitchFamily="2" charset="0"/>
                 <a:cs typeface="Space Grotesk" pitchFamily="2" charset="0"/>
               </a:rPr>
-              <a:t>SESSION</a:t>
+              <a:t>Stop manually publishing your PowerShell modules</a:t>
             </a:r>
-            <a:r>
-              <a:rPr lang="en-US" sz="10000" b="1" dirty="0">
-                <a:gradFill flip="none" rotWithShape="1">
-                  <a:gsLst>
-                    <a:gs pos="0">
-                      <a:schemeClr val="accent1"/>
-                    </a:gs>
-                    <a:gs pos="99000">
-                      <a:schemeClr val="accent2"/>
-                    </a:gs>
-                  </a:gsLst>
-                  <a:lin ang="0" scaled="1"/>
-                  <a:tileRect/>
-                </a:gradFill>
-                <a:latin typeface="Space Grotesk" pitchFamily="2" charset="0"/>
-                <a:cs typeface="Space Grotesk" pitchFamily="2" charset="0"/>
-              </a:rPr>
-              <a:t>TITLE</a:t>
-            </a:r>
+            <a:endParaRPr lang="en-US" sz="7200" b="1" dirty="0">
+              <a:gradFill flip="none" rotWithShape="1">
+                <a:gsLst>
+                  <a:gs pos="0">
+                    <a:schemeClr val="accent1"/>
+                  </a:gs>
+                  <a:gs pos="99000">
+                    <a:schemeClr val="accent2"/>
+                  </a:gs>
+                </a:gsLst>
+                <a:lin ang="0" scaled="1"/>
+                <a:tileRect/>
+              </a:gradFill>
+              <a:latin typeface="Space Grotesk" pitchFamily="2" charset="0"/>
+              <a:cs typeface="Space Grotesk" pitchFamily="2" charset="0"/>
+            </a:endParaRPr>
           </a:p>
         </p:txBody>
       </p:sp>
@@ -16151,7 +16290,7 @@
                 <a:latin typeface="Play" panose="00000500000000000000" pitchFamily="2" charset="0"/>
                 <a:cs typeface="Space Grotesk" pitchFamily="2" charset="0"/>
               </a:rPr>
-              <a:t>Your Name</a:t>
+              <a:t>Daniel Schroeder</a:t>
             </a:r>
           </a:p>
         </p:txBody>
@@ -16438,7 +16577,7 @@
                 <a:latin typeface="Play" panose="00000500000000000000" pitchFamily="2" charset="0"/>
                 <a:cs typeface="Space Grotesk" pitchFamily="2" charset="0"/>
               </a:rPr>
-              <a:t>Social Media Handle</a:t>
+              <a:t>@deadlydog</a:t>
             </a:r>
           </a:p>
         </p:txBody>
@@ -16515,6 +16654,421 @@
 </file>
 
 <file path=ppt/slides/slide3.xml><?xml version="1.0" encoding="utf-8"?>
+<p:sld xmlns:a="http://schemas.openxmlformats.org/drawingml/2006/main" xmlns:r="http://schemas.openxmlformats.org/officeDocument/2006/relationships" xmlns:p="http://schemas.openxmlformats.org/presentationml/2006/main">
+  <p:cSld>
+    <p:spTree>
+      <p:nvGrpSpPr>
+        <p:cNvPr id="1" name=""/>
+        <p:cNvGrpSpPr/>
+        <p:nvPr/>
+      </p:nvGrpSpPr>
+      <p:grpSpPr>
+        <a:xfrm>
+          <a:off x="0" y="0"/>
+          <a:ext cx="0" cy="0"/>
+          <a:chOff x="0" y="0"/>
+          <a:chExt cx="0" cy="0"/>
+        </a:xfrm>
+      </p:grpSpPr>
+      <p:sp>
+        <p:nvSpPr>
+          <p:cNvPr id="5" name="TextBox 4">
+            <a:extLst>
+              <a:ext uri="{FF2B5EF4-FFF2-40B4-BE49-F238E27FC236}">
+                <a16:creationId xmlns:a16="http://schemas.microsoft.com/office/drawing/2014/main" id="{DDC53EED-D8A2-EFE1-6513-7970D2E231E3}"/>
+              </a:ext>
+            </a:extLst>
+          </p:cNvPr>
+          <p:cNvSpPr txBox="1"/>
+          <p:nvPr/>
+        </p:nvSpPr>
+        <p:spPr>
+          <a:xfrm>
+            <a:off x="1411586" y="879231"/>
+            <a:ext cx="9368828" cy="830997"/>
+          </a:xfrm>
+          <a:prstGeom prst="rect">
+            <a:avLst/>
+          </a:prstGeom>
+          <a:noFill/>
+        </p:spPr>
+        <p:txBody>
+          <a:bodyPr wrap="square" rtlCol="0">
+            <a:spAutoFit/>
+          </a:bodyPr>
+          <a:lstStyle>
+            <a:defPPr>
+              <a:defRPr lang="en-US"/>
+            </a:defPPr>
+            <a:lvl1pPr algn="ctr">
+              <a:tabLst>
+                <a:tab pos="3835400" algn="l"/>
+              </a:tabLst>
+              <a:defRPr sz="18000" b="1">
+                <a:solidFill>
+                  <a:schemeClr val="bg1"/>
+                </a:solidFill>
+                <a:latin typeface="Space Grotesk" pitchFamily="2" charset="0"/>
+                <a:cs typeface="Space Grotesk" pitchFamily="2" charset="0"/>
+              </a:defRPr>
+            </a:lvl1pPr>
+          </a:lstStyle>
+          <a:p>
+            <a:pPr algn="l"/>
+            <a:r>
+              <a:rPr lang="en-US" sz="4800">
+                <a:gradFill>
+                  <a:gsLst>
+                    <a:gs pos="0">
+                      <a:schemeClr val="accent1"/>
+                    </a:gs>
+                    <a:gs pos="100000">
+                      <a:schemeClr val="accent2"/>
+                    </a:gs>
+                  </a:gsLst>
+                  <a:lin ang="0" scaled="0"/>
+                </a:gradFill>
+              </a:rPr>
+              <a:t>About Dan</a:t>
+            </a:r>
+            <a:endParaRPr lang="en-US" sz="4800" dirty="0">
+              <a:gradFill>
+                <a:gsLst>
+                  <a:gs pos="0">
+                    <a:schemeClr val="accent1"/>
+                  </a:gs>
+                  <a:gs pos="100000">
+                    <a:schemeClr val="accent2"/>
+                  </a:gs>
+                </a:gsLst>
+                <a:lin ang="0" scaled="0"/>
+              </a:gradFill>
+            </a:endParaRPr>
+          </a:p>
+        </p:txBody>
+      </p:sp>
+      <p:pic>
+        <p:nvPicPr>
+          <p:cNvPr id="14" name="Picture 13">
+            <a:extLst>
+              <a:ext uri="{FF2B5EF4-FFF2-40B4-BE49-F238E27FC236}">
+                <a16:creationId xmlns:a16="http://schemas.microsoft.com/office/drawing/2014/main" id="{19EF7329-3337-805F-5F20-F359F447B34B}"/>
+              </a:ext>
+            </a:extLst>
+          </p:cNvPr>
+          <p:cNvPicPr>
+            <a:picLocks noChangeAspect="1"/>
+          </p:cNvPicPr>
+          <p:nvPr/>
+        </p:nvPicPr>
+        <p:blipFill>
+          <a:blip r:embed="rId3"/>
+          <a:stretch>
+            <a:fillRect/>
+          </a:stretch>
+        </p:blipFill>
+        <p:spPr>
+          <a:xfrm>
+            <a:off x="106564" y="1710227"/>
+            <a:ext cx="11749814" cy="5064085"/>
+          </a:xfrm>
+          <a:prstGeom prst="rect">
+            <a:avLst/>
+          </a:prstGeom>
+        </p:spPr>
+      </p:pic>
+      <p:pic>
+        <p:nvPicPr>
+          <p:cNvPr id="7" name="Picture 6" descr="A person holding a bunch of bread&#10;&#10;Description automatically generated">
+            <a:extLst>
+              <a:ext uri="{FF2B5EF4-FFF2-40B4-BE49-F238E27FC236}">
+                <a16:creationId xmlns:a16="http://schemas.microsoft.com/office/drawing/2014/main" id="{C7EBCD32-A347-BB7A-1E36-DBAC45D40FB9}"/>
+              </a:ext>
+            </a:extLst>
+          </p:cNvPr>
+          <p:cNvPicPr>
+            <a:picLocks noChangeAspect="1"/>
+          </p:cNvPicPr>
+          <p:nvPr/>
+        </p:nvPicPr>
+        <p:blipFill>
+          <a:blip r:embed="rId4"/>
+          <a:stretch>
+            <a:fillRect/>
+          </a:stretch>
+        </p:blipFill>
+        <p:spPr>
+          <a:xfrm>
+            <a:off x="5971291" y="454217"/>
+            <a:ext cx="4261769" cy="3196327"/>
+          </a:xfrm>
+          <a:prstGeom prst="rect">
+            <a:avLst/>
+          </a:prstGeom>
+        </p:spPr>
+      </p:pic>
+    </p:spTree>
+    <p:extLst>
+      <p:ext uri="{BB962C8B-B14F-4D97-AF65-F5344CB8AC3E}">
+        <p14:creationId xmlns:p14="http://schemas.microsoft.com/office/powerpoint/2010/main" val="2982201005"/>
+      </p:ext>
+    </p:extLst>
+  </p:cSld>
+  <p:clrMapOvr>
+    <a:masterClrMapping/>
+  </p:clrMapOvr>
+</p:sld>
+</file>
+
+<file path=ppt/slides/slide4.xml><?xml version="1.0" encoding="utf-8"?>
+<p:sld xmlns:a="http://schemas.openxmlformats.org/drawingml/2006/main" xmlns:r="http://schemas.openxmlformats.org/officeDocument/2006/relationships" xmlns:p="http://schemas.openxmlformats.org/presentationml/2006/main">
+  <p:cSld>
+    <p:spTree>
+      <p:nvGrpSpPr>
+        <p:cNvPr id="1" name=""/>
+        <p:cNvGrpSpPr/>
+        <p:nvPr/>
+      </p:nvGrpSpPr>
+      <p:grpSpPr>
+        <a:xfrm>
+          <a:off x="0" y="0"/>
+          <a:ext cx="0" cy="0"/>
+          <a:chOff x="0" y="0"/>
+          <a:chExt cx="0" cy="0"/>
+        </a:xfrm>
+      </p:grpSpPr>
+      <p:sp>
+        <p:nvSpPr>
+          <p:cNvPr id="4" name="Text Placeholder 3">
+            <a:extLst>
+              <a:ext uri="{FF2B5EF4-FFF2-40B4-BE49-F238E27FC236}">
+                <a16:creationId xmlns:a16="http://schemas.microsoft.com/office/drawing/2014/main" id="{9E69EAED-464E-BBBF-03FD-FD2E1A0F0824}"/>
+              </a:ext>
+            </a:extLst>
+          </p:cNvPr>
+          <p:cNvSpPr>
+            <a:spLocks noGrp="1"/>
+          </p:cNvSpPr>
+          <p:nvPr>
+            <p:ph type="body" sz="quarter" idx="10"/>
+          </p:nvPr>
+        </p:nvSpPr>
+        <p:spPr>
+          <a:xfrm>
+            <a:off x="1362375" y="1992193"/>
+            <a:ext cx="9903723" cy="3986576"/>
+          </a:xfrm>
+        </p:spPr>
+        <p:txBody>
+          <a:bodyPr/>
+          <a:lstStyle/>
+          <a:p>
+            <a:endParaRPr lang="en-US" dirty="0"/>
+          </a:p>
+        </p:txBody>
+      </p:sp>
+      <p:sp>
+        <p:nvSpPr>
+          <p:cNvPr id="5" name="TextBox 4">
+            <a:extLst>
+              <a:ext uri="{FF2B5EF4-FFF2-40B4-BE49-F238E27FC236}">
+                <a16:creationId xmlns:a16="http://schemas.microsoft.com/office/drawing/2014/main" id="{DDC53EED-D8A2-EFE1-6513-7970D2E231E3}"/>
+              </a:ext>
+            </a:extLst>
+          </p:cNvPr>
+          <p:cNvSpPr txBox="1"/>
+          <p:nvPr/>
+        </p:nvSpPr>
+        <p:spPr>
+          <a:xfrm>
+            <a:off x="1411586" y="879231"/>
+            <a:ext cx="9368828" cy="830997"/>
+          </a:xfrm>
+          <a:prstGeom prst="rect">
+            <a:avLst/>
+          </a:prstGeom>
+          <a:noFill/>
+        </p:spPr>
+        <p:txBody>
+          <a:bodyPr wrap="square" rtlCol="0">
+            <a:spAutoFit/>
+          </a:bodyPr>
+          <a:lstStyle>
+            <a:defPPr>
+              <a:defRPr lang="en-US"/>
+            </a:defPPr>
+            <a:lvl1pPr algn="ctr">
+              <a:tabLst>
+                <a:tab pos="3835400" algn="l"/>
+              </a:tabLst>
+              <a:defRPr sz="18000" b="1">
+                <a:solidFill>
+                  <a:schemeClr val="bg1"/>
+                </a:solidFill>
+                <a:latin typeface="Space Grotesk" pitchFamily="2" charset="0"/>
+                <a:cs typeface="Space Grotesk" pitchFamily="2" charset="0"/>
+              </a:defRPr>
+            </a:lvl1pPr>
+          </a:lstStyle>
+          <a:p>
+            <a:pPr algn="l"/>
+            <a:r>
+              <a:rPr lang="en-US" sz="4800" dirty="0">
+                <a:gradFill>
+                  <a:gsLst>
+                    <a:gs pos="0">
+                      <a:schemeClr val="accent1"/>
+                    </a:gs>
+                    <a:gs pos="100000">
+                      <a:schemeClr val="accent2"/>
+                    </a:gs>
+                  </a:gsLst>
+                  <a:lin ang="0" scaled="0"/>
+                </a:gradFill>
+              </a:rPr>
+              <a:t>Agenda</a:t>
+            </a:r>
+          </a:p>
+        </p:txBody>
+      </p:sp>
+    </p:spTree>
+    <p:extLst>
+      <p:ext uri="{BB962C8B-B14F-4D97-AF65-F5344CB8AC3E}">
+        <p14:creationId xmlns:p14="http://schemas.microsoft.com/office/powerpoint/2010/main" val="941066589"/>
+      </p:ext>
+    </p:extLst>
+  </p:cSld>
+  <p:clrMapOvr>
+    <a:masterClrMapping/>
+  </p:clrMapOvr>
+</p:sld>
+</file>
+
+<file path=ppt/slides/slide5.xml><?xml version="1.0" encoding="utf-8"?>
+<p:sld xmlns:a="http://schemas.openxmlformats.org/drawingml/2006/main" xmlns:r="http://schemas.openxmlformats.org/officeDocument/2006/relationships" xmlns:p="http://schemas.openxmlformats.org/presentationml/2006/main">
+  <p:cSld>
+    <p:spTree>
+      <p:nvGrpSpPr>
+        <p:cNvPr id="1" name=""/>
+        <p:cNvGrpSpPr/>
+        <p:nvPr/>
+      </p:nvGrpSpPr>
+      <p:grpSpPr>
+        <a:xfrm>
+          <a:off x="0" y="0"/>
+          <a:ext cx="0" cy="0"/>
+          <a:chOff x="0" y="0"/>
+          <a:chExt cx="0" cy="0"/>
+        </a:xfrm>
+      </p:grpSpPr>
+      <p:sp>
+        <p:nvSpPr>
+          <p:cNvPr id="4" name="Text Placeholder 3">
+            <a:extLst>
+              <a:ext uri="{FF2B5EF4-FFF2-40B4-BE49-F238E27FC236}">
+                <a16:creationId xmlns:a16="http://schemas.microsoft.com/office/drawing/2014/main" id="{9E69EAED-464E-BBBF-03FD-FD2E1A0F0824}"/>
+              </a:ext>
+            </a:extLst>
+          </p:cNvPr>
+          <p:cNvSpPr>
+            <a:spLocks noGrp="1"/>
+          </p:cNvSpPr>
+          <p:nvPr>
+            <p:ph type="body" sz="quarter" idx="10"/>
+          </p:nvPr>
+        </p:nvSpPr>
+        <p:spPr>
+          <a:xfrm>
+            <a:off x="1362375" y="1992193"/>
+            <a:ext cx="9903723" cy="3986576"/>
+          </a:xfrm>
+        </p:spPr>
+        <p:txBody>
+          <a:bodyPr/>
+          <a:lstStyle/>
+          <a:p>
+            <a:endParaRPr lang="en-US" dirty="0"/>
+          </a:p>
+        </p:txBody>
+      </p:sp>
+      <p:sp>
+        <p:nvSpPr>
+          <p:cNvPr id="5" name="TextBox 4">
+            <a:extLst>
+              <a:ext uri="{FF2B5EF4-FFF2-40B4-BE49-F238E27FC236}">
+                <a16:creationId xmlns:a16="http://schemas.microsoft.com/office/drawing/2014/main" id="{DDC53EED-D8A2-EFE1-6513-7970D2E231E3}"/>
+              </a:ext>
+            </a:extLst>
+          </p:cNvPr>
+          <p:cNvSpPr txBox="1"/>
+          <p:nvPr/>
+        </p:nvSpPr>
+        <p:spPr>
+          <a:xfrm>
+            <a:off x="1411586" y="879231"/>
+            <a:ext cx="9368828" cy="830997"/>
+          </a:xfrm>
+          <a:prstGeom prst="rect">
+            <a:avLst/>
+          </a:prstGeom>
+          <a:noFill/>
+        </p:spPr>
+        <p:txBody>
+          <a:bodyPr wrap="square" rtlCol="0">
+            <a:spAutoFit/>
+          </a:bodyPr>
+          <a:lstStyle>
+            <a:defPPr>
+              <a:defRPr lang="en-US"/>
+            </a:defPPr>
+            <a:lvl1pPr algn="ctr">
+              <a:tabLst>
+                <a:tab pos="3835400" algn="l"/>
+              </a:tabLst>
+              <a:defRPr sz="18000" b="1">
+                <a:solidFill>
+                  <a:schemeClr val="bg1"/>
+                </a:solidFill>
+                <a:latin typeface="Space Grotesk" pitchFamily="2" charset="0"/>
+                <a:cs typeface="Space Grotesk" pitchFamily="2" charset="0"/>
+              </a:defRPr>
+            </a:lvl1pPr>
+          </a:lstStyle>
+          <a:p>
+            <a:pPr algn="l"/>
+            <a:r>
+              <a:rPr lang="en-US" sz="4800" dirty="0">
+                <a:gradFill>
+                  <a:gsLst>
+                    <a:gs pos="0">
+                      <a:schemeClr val="accent1"/>
+                    </a:gs>
+                    <a:gs pos="100000">
+                      <a:schemeClr val="accent2"/>
+                    </a:gs>
+                  </a:gsLst>
+                  <a:lin ang="0" scaled="0"/>
+                </a:gradFill>
+              </a:rPr>
+              <a:t>Agenda</a:t>
+            </a:r>
+          </a:p>
+        </p:txBody>
+      </p:sp>
+    </p:spTree>
+    <p:extLst>
+      <p:ext uri="{BB962C8B-B14F-4D97-AF65-F5344CB8AC3E}">
+        <p14:creationId xmlns:p14="http://schemas.microsoft.com/office/powerpoint/2010/main" val="3458892955"/>
+      </p:ext>
+    </p:extLst>
+  </p:cSld>
+  <p:clrMapOvr>
+    <a:masterClrMapping/>
+  </p:clrMapOvr>
+</p:sld>
+</file>
+
+<file path=ppt/slides/slide6.xml><?xml version="1.0" encoding="utf-8"?>
 <p:sld xmlns:a="http://schemas.openxmlformats.org/drawingml/2006/main" xmlns:r="http://schemas.openxmlformats.org/officeDocument/2006/relationships" xmlns:p="http://schemas.openxmlformats.org/presentationml/2006/main">
   <p:cSld>
     <p:spTree>
@@ -16674,6 +17228,130 @@
     <p:extLst>
       <p:ext uri="{BB962C8B-B14F-4D97-AF65-F5344CB8AC3E}">
         <p14:creationId xmlns:p14="http://schemas.microsoft.com/office/powerpoint/2010/main" val="194438742"/>
+      </p:ext>
+    </p:extLst>
+  </p:cSld>
+  <p:clrMapOvr>
+    <a:masterClrMapping/>
+  </p:clrMapOvr>
+</p:sld>
+</file>
+
+<file path=ppt/slides/slide7.xml><?xml version="1.0" encoding="utf-8"?>
+<p:sld xmlns:a="http://schemas.openxmlformats.org/drawingml/2006/main" xmlns:r="http://schemas.openxmlformats.org/officeDocument/2006/relationships" xmlns:p="http://schemas.openxmlformats.org/presentationml/2006/main">
+  <p:cSld>
+    <p:spTree>
+      <p:nvGrpSpPr>
+        <p:cNvPr id="1" name=""/>
+        <p:cNvGrpSpPr/>
+        <p:nvPr/>
+      </p:nvGrpSpPr>
+      <p:grpSpPr>
+        <a:xfrm>
+          <a:off x="0" y="0"/>
+          <a:ext cx="0" cy="0"/>
+          <a:chOff x="0" y="0"/>
+          <a:chExt cx="0" cy="0"/>
+        </a:xfrm>
+      </p:grpSpPr>
+      <p:sp>
+        <p:nvSpPr>
+          <p:cNvPr id="4" name="Text Placeholder 3">
+            <a:extLst>
+              <a:ext uri="{FF2B5EF4-FFF2-40B4-BE49-F238E27FC236}">
+                <a16:creationId xmlns:a16="http://schemas.microsoft.com/office/drawing/2014/main" id="{9E69EAED-464E-BBBF-03FD-FD2E1A0F0824}"/>
+              </a:ext>
+            </a:extLst>
+          </p:cNvPr>
+          <p:cNvSpPr>
+            <a:spLocks noGrp="1"/>
+          </p:cNvSpPr>
+          <p:nvPr>
+            <p:ph type="body" sz="quarter" idx="10"/>
+          </p:nvPr>
+        </p:nvSpPr>
+        <p:spPr>
+          <a:xfrm>
+            <a:off x="1362375" y="1992193"/>
+            <a:ext cx="9903723" cy="3986576"/>
+          </a:xfrm>
+        </p:spPr>
+        <p:txBody>
+          <a:bodyPr/>
+          <a:lstStyle/>
+          <a:p>
+            <a:endParaRPr lang="en-US" dirty="0"/>
+          </a:p>
+        </p:txBody>
+      </p:sp>
+      <p:sp>
+        <p:nvSpPr>
+          <p:cNvPr id="5" name="TextBox 4">
+            <a:extLst>
+              <a:ext uri="{FF2B5EF4-FFF2-40B4-BE49-F238E27FC236}">
+                <a16:creationId xmlns:a16="http://schemas.microsoft.com/office/drawing/2014/main" id="{DDC53EED-D8A2-EFE1-6513-7970D2E231E3}"/>
+              </a:ext>
+            </a:extLst>
+          </p:cNvPr>
+          <p:cNvSpPr txBox="1"/>
+          <p:nvPr/>
+        </p:nvSpPr>
+        <p:spPr>
+          <a:xfrm>
+            <a:off x="1411586" y="879231"/>
+            <a:ext cx="9368828" cy="830997"/>
+          </a:xfrm>
+          <a:prstGeom prst="rect">
+            <a:avLst/>
+          </a:prstGeom>
+          <a:noFill/>
+        </p:spPr>
+        <p:txBody>
+          <a:bodyPr wrap="square" rtlCol="0">
+            <a:spAutoFit/>
+          </a:bodyPr>
+          <a:lstStyle>
+            <a:defPPr>
+              <a:defRPr lang="en-US"/>
+            </a:defPPr>
+            <a:lvl1pPr algn="ctr">
+              <a:tabLst>
+                <a:tab pos="3835400" algn="l"/>
+              </a:tabLst>
+              <a:defRPr sz="18000" b="1">
+                <a:solidFill>
+                  <a:schemeClr val="bg1"/>
+                </a:solidFill>
+                <a:latin typeface="Space Grotesk" pitchFamily="2" charset="0"/>
+                <a:cs typeface="Space Grotesk" pitchFamily="2" charset="0"/>
+              </a:defRPr>
+            </a:lvl1pPr>
+          </a:lstStyle>
+          <a:p>
+            <a:pPr algn="l"/>
+            <a:r>
+              <a:rPr lang="en-US" sz="4800" dirty="0">
+                <a:gradFill>
+                  <a:gsLst>
+                    <a:gs pos="0">
+                      <a:schemeClr val="accent1"/>
+                    </a:gs>
+                    <a:gs pos="100000">
+                      <a:schemeClr val="accent2"/>
+                    </a:gs>
+                  </a:gsLst>
+                  <a:lin ang="0" scaled="0"/>
+                </a:gradFill>
+              </a:rPr>
+              <a:t>Heading</a:t>
+            </a:r>
+          </a:p>
+        </p:txBody>
+      </p:sp>
+    </p:spTree>
+    <p:extLst>
+      <p:ext uri="{BB962C8B-B14F-4D97-AF65-F5344CB8AC3E}">
+        <p14:creationId xmlns:p14="http://schemas.microsoft.com/office/powerpoint/2010/main" val="1764268837"/>
       </p:ext>
     </p:extLst>
   </p:cSld>

</xml_diff>

<commit_message>
- Updated presentation heading
- Increased font size for all slides from 28 to 32
- Added social network handles
- Added blog screenshots slide
- Added Agenda and first couple slides on why use modules
</commit_message>
<xml_diff>
--- a/src/Stop manually publishing your PowerShell modules.pptx
+++ b/src/Stop manually publishing your PowerShell modules.pptx
@@ -5,16 +5,22 @@
     <p:sldMasterId id="2147483648" r:id="rId1"/>
   </p:sldMasterIdLst>
   <p:notesMasterIdLst>
-    <p:notesMasterId r:id="rId9"/>
+    <p:notesMasterId r:id="rId15"/>
   </p:notesMasterIdLst>
   <p:sldIdLst>
     <p:sldId id="256" r:id="rId2"/>
     <p:sldId id="271" r:id="rId3"/>
     <p:sldId id="272" r:id="rId4"/>
     <p:sldId id="274" r:id="rId5"/>
-    <p:sldId id="275" r:id="rId6"/>
-    <p:sldId id="270" r:id="rId7"/>
-    <p:sldId id="273" r:id="rId8"/>
+    <p:sldId id="279" r:id="rId6"/>
+    <p:sldId id="280" r:id="rId7"/>
+    <p:sldId id="281" r:id="rId8"/>
+    <p:sldId id="275" r:id="rId9"/>
+    <p:sldId id="276" r:id="rId10"/>
+    <p:sldId id="278" r:id="rId11"/>
+    <p:sldId id="277" r:id="rId12"/>
+    <p:sldId id="270" r:id="rId13"/>
+    <p:sldId id="273" r:id="rId14"/>
   </p:sldIdLst>
   <p:sldSz cx="12192000" cy="6858000"/>
   <p:notesSz cx="6858000" cy="9144000"/>
@@ -1289,7 +1295,7 @@
           <a:p>
             <a:fld id="{71DD7AA7-6947-46DE-8F8D-972DE75C4888}" type="datetimeFigureOut">
               <a:rPr lang="en-US" smtClean="0"/>
-              <a:t>3/2/2024</a:t>
+              <a:t>3/23/2024</a:t>
             </a:fld>
             <a:endParaRPr lang="en-US"/>
           </a:p>
@@ -1769,6 +1775,341 @@
     <p:extLst>
       <p:ext uri="{BB962C8B-B14F-4D97-AF65-F5344CB8AC3E}">
         <p14:creationId xmlns:p14="http://schemas.microsoft.com/office/powerpoint/2010/main" val="2226918087"/>
+      </p:ext>
+    </p:extLst>
+  </p:cSld>
+  <p:clrMapOvr>
+    <a:masterClrMapping/>
+  </p:clrMapOvr>
+</p:notes>
+</file>
+
+<file path=ppt/notesSlides/notesSlide3.xml><?xml version="1.0" encoding="utf-8"?>
+<p:notes xmlns:a="http://schemas.openxmlformats.org/drawingml/2006/main" xmlns:r="http://schemas.openxmlformats.org/officeDocument/2006/relationships" xmlns:p="http://schemas.openxmlformats.org/presentationml/2006/main">
+  <p:cSld>
+    <p:spTree>
+      <p:nvGrpSpPr>
+        <p:cNvPr id="1" name=""/>
+        <p:cNvGrpSpPr/>
+        <p:nvPr/>
+      </p:nvGrpSpPr>
+      <p:grpSpPr>
+        <a:xfrm>
+          <a:off x="0" y="0"/>
+          <a:ext cx="0" cy="0"/>
+          <a:chOff x="0" y="0"/>
+          <a:chExt cx="0" cy="0"/>
+        </a:xfrm>
+      </p:grpSpPr>
+      <p:sp>
+        <p:nvSpPr>
+          <p:cNvPr id="2" name="Slide Image Placeholder 1"/>
+          <p:cNvSpPr>
+            <a:spLocks noGrp="1" noRot="1" noChangeAspect="1"/>
+          </p:cNvSpPr>
+          <p:nvPr>
+            <p:ph type="sldImg"/>
+          </p:nvPr>
+        </p:nvSpPr>
+        <p:spPr/>
+      </p:sp>
+      <p:sp>
+        <p:nvSpPr>
+          <p:cNvPr id="3" name="Notes Placeholder 2"/>
+          <p:cNvSpPr>
+            <a:spLocks noGrp="1"/>
+          </p:cNvSpPr>
+          <p:nvPr>
+            <p:ph type="body" idx="1"/>
+          </p:nvPr>
+        </p:nvSpPr>
+        <p:spPr/>
+        <p:txBody>
+          <a:bodyPr/>
+          <a:lstStyle/>
+          <a:p>
+            <a:r>
+              <a:rPr lang="en-US" dirty="0"/>
+              <a:t>- This is what my blog looks like now</a:t>
+            </a:r>
+          </a:p>
+          <a:p>
+            <a:r>
+              <a:rPr lang="en-US" dirty="0"/>
+              <a:t>- and before 2020</a:t>
+            </a:r>
+          </a:p>
+          <a:p>
+            <a:r>
+              <a:rPr lang="en-US" dirty="0"/>
+              <a:t>- If either look familiar, then you’ve likely visited my blog before</a:t>
+            </a:r>
+          </a:p>
+        </p:txBody>
+      </p:sp>
+      <p:sp>
+        <p:nvSpPr>
+          <p:cNvPr id="4" name="Slide Number Placeholder 3"/>
+          <p:cNvSpPr>
+            <a:spLocks noGrp="1"/>
+          </p:cNvSpPr>
+          <p:nvPr>
+            <p:ph type="sldNum" sz="quarter" idx="5"/>
+          </p:nvPr>
+        </p:nvSpPr>
+        <p:spPr/>
+        <p:txBody>
+          <a:bodyPr/>
+          <a:lstStyle/>
+          <a:p>
+            <a:fld id="{86D6F596-DFBB-42B8-ADCC-5FC29CF5B495}" type="slidenum">
+              <a:rPr lang="en-US" smtClean="0"/>
+              <a:t>4</a:t>
+            </a:fld>
+            <a:endParaRPr lang="en-US"/>
+          </a:p>
+        </p:txBody>
+      </p:sp>
+    </p:spTree>
+    <p:extLst>
+      <p:ext uri="{BB962C8B-B14F-4D97-AF65-F5344CB8AC3E}">
+        <p14:creationId xmlns:p14="http://schemas.microsoft.com/office/powerpoint/2010/main" val="119033412"/>
+      </p:ext>
+    </p:extLst>
+  </p:cSld>
+  <p:clrMapOvr>
+    <a:masterClrMapping/>
+  </p:clrMapOvr>
+</p:notes>
+</file>
+
+<file path=ppt/notesSlides/notesSlide4.xml><?xml version="1.0" encoding="utf-8"?>
+<p:notes xmlns:a="http://schemas.openxmlformats.org/drawingml/2006/main" xmlns:r="http://schemas.openxmlformats.org/officeDocument/2006/relationships" xmlns:p="http://schemas.openxmlformats.org/presentationml/2006/main">
+  <p:cSld>
+    <p:spTree>
+      <p:nvGrpSpPr>
+        <p:cNvPr id="1" name=""/>
+        <p:cNvGrpSpPr/>
+        <p:nvPr/>
+      </p:nvGrpSpPr>
+      <p:grpSpPr>
+        <a:xfrm>
+          <a:off x="0" y="0"/>
+          <a:ext cx="0" cy="0"/>
+          <a:chOff x="0" y="0"/>
+          <a:chExt cx="0" cy="0"/>
+        </a:xfrm>
+      </p:grpSpPr>
+      <p:sp>
+        <p:nvSpPr>
+          <p:cNvPr id="2" name="Slide Image Placeholder 1"/>
+          <p:cNvSpPr>
+            <a:spLocks noGrp="1" noRot="1" noChangeAspect="1"/>
+          </p:cNvSpPr>
+          <p:nvPr>
+            <p:ph type="sldImg"/>
+          </p:nvPr>
+        </p:nvSpPr>
+        <p:spPr/>
+      </p:sp>
+      <p:sp>
+        <p:nvSpPr>
+          <p:cNvPr id="3" name="Notes Placeholder 2"/>
+          <p:cNvSpPr>
+            <a:spLocks noGrp="1"/>
+          </p:cNvSpPr>
+          <p:nvPr>
+            <p:ph type="body" idx="1"/>
+          </p:nvPr>
+        </p:nvSpPr>
+        <p:spPr/>
+        <p:txBody>
+          <a:bodyPr/>
+          <a:lstStyle/>
+          <a:p>
+            <a:r>
+              <a:rPr lang="en-US" dirty="0"/>
+              <a:t>- Install the module with a single command</a:t>
+            </a:r>
+          </a:p>
+          <a:p>
+            <a:pPr marL="0" marR="0" lvl="0" indent="0" algn="l" defTabSz="914400" rtl="0" eaLnBrk="1" fontAlgn="auto" latinLnBrk="0" hangingPunct="1">
+              <a:lnSpc>
+                <a:spcPct val="100000"/>
+              </a:lnSpc>
+              <a:spcBef>
+                <a:spcPts val="0"/>
+              </a:spcBef>
+              <a:spcAft>
+                <a:spcPts val="0"/>
+              </a:spcAft>
+              <a:buClrTx/>
+              <a:buSzTx/>
+              <a:buFontTx/>
+              <a:buNone/>
+              <a:tabLst/>
+              <a:defRPr/>
+            </a:pPr>
+            <a:r>
+              <a:rPr lang="en-US" dirty="0"/>
+              <a:t>  - Don’t have to worry about where the script is stored</a:t>
+            </a:r>
+          </a:p>
+          <a:p>
+            <a:r>
+              <a:rPr lang="en-US" dirty="0"/>
+              <a:t>- Update to the latest version with a single command</a:t>
+            </a:r>
+          </a:p>
+          <a:p>
+            <a:r>
+              <a:rPr lang="en-US" dirty="0"/>
+              <a:t>  - Don’t have to inspect script contents to ensure you have the latest version</a:t>
+            </a:r>
+          </a:p>
+          <a:p>
+            <a:r>
+              <a:rPr lang="en-US" dirty="0"/>
+              <a:t>- Call the cmdlets without worrying about where the script’s file path is</a:t>
+            </a:r>
+          </a:p>
+        </p:txBody>
+      </p:sp>
+      <p:sp>
+        <p:nvSpPr>
+          <p:cNvPr id="4" name="Slide Number Placeholder 3"/>
+          <p:cNvSpPr>
+            <a:spLocks noGrp="1"/>
+          </p:cNvSpPr>
+          <p:nvPr>
+            <p:ph type="sldNum" sz="quarter" idx="5"/>
+          </p:nvPr>
+        </p:nvSpPr>
+        <p:spPr/>
+        <p:txBody>
+          <a:bodyPr/>
+          <a:lstStyle/>
+          <a:p>
+            <a:fld id="{86D6F596-DFBB-42B8-ADCC-5FC29CF5B495}" type="slidenum">
+              <a:rPr lang="en-US" smtClean="0"/>
+              <a:t>6</a:t>
+            </a:fld>
+            <a:endParaRPr lang="en-US"/>
+          </a:p>
+        </p:txBody>
+      </p:sp>
+    </p:spTree>
+    <p:extLst>
+      <p:ext uri="{BB962C8B-B14F-4D97-AF65-F5344CB8AC3E}">
+        <p14:creationId xmlns:p14="http://schemas.microsoft.com/office/powerpoint/2010/main" val="723802273"/>
+      </p:ext>
+    </p:extLst>
+  </p:cSld>
+  <p:clrMapOvr>
+    <a:masterClrMapping/>
+  </p:clrMapOvr>
+</p:notes>
+</file>
+
+<file path=ppt/notesSlides/notesSlide5.xml><?xml version="1.0" encoding="utf-8"?>
+<p:notes xmlns:a="http://schemas.openxmlformats.org/drawingml/2006/main" xmlns:r="http://schemas.openxmlformats.org/officeDocument/2006/relationships" xmlns:p="http://schemas.openxmlformats.org/presentationml/2006/main">
+  <p:cSld>
+    <p:spTree>
+      <p:nvGrpSpPr>
+        <p:cNvPr id="1" name="">
+          <a:extLst>
+            <a:ext uri="{FF2B5EF4-FFF2-40B4-BE49-F238E27FC236}">
+              <a16:creationId xmlns:a16="http://schemas.microsoft.com/office/drawing/2014/main" id="{09DC8098-084D-3A69-80C0-4D7EEB453921}"/>
+            </a:ext>
+          </a:extLst>
+        </p:cNvPr>
+        <p:cNvGrpSpPr/>
+        <p:nvPr/>
+      </p:nvGrpSpPr>
+      <p:grpSpPr>
+        <a:xfrm>
+          <a:off x="0" y="0"/>
+          <a:ext cx="0" cy="0"/>
+          <a:chOff x="0" y="0"/>
+          <a:chExt cx="0" cy="0"/>
+        </a:xfrm>
+      </p:grpSpPr>
+      <p:sp>
+        <p:nvSpPr>
+          <p:cNvPr id="2" name="Slide Image Placeholder 1">
+            <a:extLst>
+              <a:ext uri="{FF2B5EF4-FFF2-40B4-BE49-F238E27FC236}">
+                <a16:creationId xmlns:a16="http://schemas.microsoft.com/office/drawing/2014/main" id="{48372AF9-097B-C1BF-6675-5EA01B869DF5}"/>
+              </a:ext>
+            </a:extLst>
+          </p:cNvPr>
+          <p:cNvSpPr>
+            <a:spLocks noGrp="1" noRot="1" noChangeAspect="1"/>
+          </p:cNvSpPr>
+          <p:nvPr>
+            <p:ph type="sldImg"/>
+          </p:nvPr>
+        </p:nvSpPr>
+        <p:spPr/>
+      </p:sp>
+      <p:sp>
+        <p:nvSpPr>
+          <p:cNvPr id="3" name="Notes Placeholder 2">
+            <a:extLst>
+              <a:ext uri="{FF2B5EF4-FFF2-40B4-BE49-F238E27FC236}">
+                <a16:creationId xmlns:a16="http://schemas.microsoft.com/office/drawing/2014/main" id="{8A4AADB7-5F67-1BF8-C2F0-67A5654DEAA3}"/>
+              </a:ext>
+            </a:extLst>
+          </p:cNvPr>
+          <p:cNvSpPr>
+            <a:spLocks noGrp="1"/>
+          </p:cNvSpPr>
+          <p:nvPr>
+            <p:ph type="body" idx="1"/>
+          </p:nvPr>
+        </p:nvSpPr>
+        <p:spPr/>
+        <p:txBody>
+          <a:bodyPr/>
+          <a:lstStyle/>
+          <a:p>
+            <a:endParaRPr lang="en-US" dirty="0"/>
+          </a:p>
+        </p:txBody>
+      </p:sp>
+      <p:sp>
+        <p:nvSpPr>
+          <p:cNvPr id="4" name="Slide Number Placeholder 3">
+            <a:extLst>
+              <a:ext uri="{FF2B5EF4-FFF2-40B4-BE49-F238E27FC236}">
+                <a16:creationId xmlns:a16="http://schemas.microsoft.com/office/drawing/2014/main" id="{F1A8DC7B-AB50-430F-BA54-7122CBBD9093}"/>
+              </a:ext>
+            </a:extLst>
+          </p:cNvPr>
+          <p:cNvSpPr>
+            <a:spLocks noGrp="1"/>
+          </p:cNvSpPr>
+          <p:nvPr>
+            <p:ph type="sldNum" sz="quarter" idx="5"/>
+          </p:nvPr>
+        </p:nvSpPr>
+        <p:spPr/>
+        <p:txBody>
+          <a:bodyPr/>
+          <a:lstStyle/>
+          <a:p>
+            <a:fld id="{86D6F596-DFBB-42B8-ADCC-5FC29CF5B495}" type="slidenum">
+              <a:rPr lang="en-US" smtClean="0"/>
+              <a:t>7</a:t>
+            </a:fld>
+            <a:endParaRPr lang="en-US"/>
+          </a:p>
+        </p:txBody>
+      </p:sp>
+    </p:spTree>
+    <p:extLst>
+      <p:ext uri="{BB962C8B-B14F-4D97-AF65-F5344CB8AC3E}">
+        <p14:creationId xmlns:p14="http://schemas.microsoft.com/office/powerpoint/2010/main" val="155521897"/>
       </p:ext>
     </p:extLst>
   </p:cSld>
@@ -16201,7 +16542,7 @@
         </p:nvSpPr>
         <p:spPr>
           <a:xfrm>
-            <a:off x="196646" y="1129334"/>
+            <a:off x="196646" y="882758"/>
             <a:ext cx="11798708" cy="2308324"/>
           </a:xfrm>
           <a:prstGeom prst="rect">
@@ -16582,10 +16923,819 @@
           </a:p>
         </p:txBody>
       </p:sp>
+      <p:sp>
+        <p:nvSpPr>
+          <p:cNvPr id="28" name="TextBox 27">
+            <a:extLst>
+              <a:ext uri="{FF2B5EF4-FFF2-40B4-BE49-F238E27FC236}">
+                <a16:creationId xmlns:a16="http://schemas.microsoft.com/office/drawing/2014/main" id="{6082F12A-D749-3A28-7234-84DE8492A9E9}"/>
+              </a:ext>
+            </a:extLst>
+          </p:cNvPr>
+          <p:cNvSpPr txBox="1"/>
+          <p:nvPr/>
+        </p:nvSpPr>
+        <p:spPr>
+          <a:xfrm>
+            <a:off x="227246" y="2938757"/>
+            <a:ext cx="11798708" cy="923330"/>
+          </a:xfrm>
+          <a:prstGeom prst="rect">
+            <a:avLst/>
+          </a:prstGeom>
+          <a:noFill/>
+        </p:spPr>
+        <p:txBody>
+          <a:bodyPr wrap="square" rtlCol="0">
+            <a:spAutoFit/>
+          </a:bodyPr>
+          <a:lstStyle/>
+          <a:p>
+            <a:pPr algn="ctr">
+              <a:tabLst>
+                <a:tab pos="3835400" algn="l"/>
+              </a:tabLst>
+            </a:pPr>
+            <a:r>
+              <a:rPr lang="en-US" sz="5400" b="1" dirty="0">
+                <a:solidFill>
+                  <a:srgbClr val="FFC000"/>
+                </a:solidFill>
+                <a:latin typeface="Space Grotesk" pitchFamily="2" charset="0"/>
+                <a:cs typeface="Space Grotesk" pitchFamily="2" charset="0"/>
+              </a:rPr>
+              <a:t>Automate it in 2 minutes!</a:t>
+            </a:r>
+          </a:p>
+        </p:txBody>
+      </p:sp>
+      <p:pic>
+        <p:nvPicPr>
+          <p:cNvPr id="29" name="Picture 28" descr="A blue bird with black background&#10;&#10;Description automatically generated">
+            <a:extLst>
+              <a:ext uri="{FF2B5EF4-FFF2-40B4-BE49-F238E27FC236}">
+                <a16:creationId xmlns:a16="http://schemas.microsoft.com/office/drawing/2014/main" id="{D696F39C-935C-CEE1-18F8-7198B0556B68}"/>
+              </a:ext>
+            </a:extLst>
+          </p:cNvPr>
+          <p:cNvPicPr>
+            <a:picLocks noChangeAspect="1"/>
+          </p:cNvPicPr>
+          <p:nvPr/>
+        </p:nvPicPr>
+        <p:blipFill>
+          <a:blip r:embed="rId3"/>
+          <a:stretch>
+            <a:fillRect/>
+          </a:stretch>
+        </p:blipFill>
+        <p:spPr>
+          <a:xfrm>
+            <a:off x="4654509" y="4756600"/>
+            <a:ext cx="422043" cy="347156"/>
+          </a:xfrm>
+          <a:prstGeom prst="rect">
+            <a:avLst/>
+          </a:prstGeom>
+        </p:spPr>
+      </p:pic>
     </p:spTree>
     <p:extLst>
       <p:ext uri="{BB962C8B-B14F-4D97-AF65-F5344CB8AC3E}">
         <p14:creationId xmlns:p14="http://schemas.microsoft.com/office/powerpoint/2010/main" val="3331109375"/>
+      </p:ext>
+    </p:extLst>
+  </p:cSld>
+  <p:clrMapOvr>
+    <a:masterClrMapping/>
+  </p:clrMapOvr>
+</p:sld>
+</file>
+
+<file path=ppt/slides/slide10.xml><?xml version="1.0" encoding="utf-8"?>
+<p:sld xmlns:a="http://schemas.openxmlformats.org/drawingml/2006/main" xmlns:r="http://schemas.openxmlformats.org/officeDocument/2006/relationships" xmlns:p="http://schemas.openxmlformats.org/presentationml/2006/main">
+  <p:cSld>
+    <p:spTree>
+      <p:nvGrpSpPr>
+        <p:cNvPr id="1" name=""/>
+        <p:cNvGrpSpPr/>
+        <p:nvPr/>
+      </p:nvGrpSpPr>
+      <p:grpSpPr>
+        <a:xfrm>
+          <a:off x="0" y="0"/>
+          <a:ext cx="0" cy="0"/>
+          <a:chOff x="0" y="0"/>
+          <a:chExt cx="0" cy="0"/>
+        </a:xfrm>
+      </p:grpSpPr>
+      <p:sp>
+        <p:nvSpPr>
+          <p:cNvPr id="4" name="Text Placeholder 3">
+            <a:extLst>
+              <a:ext uri="{FF2B5EF4-FFF2-40B4-BE49-F238E27FC236}">
+                <a16:creationId xmlns:a16="http://schemas.microsoft.com/office/drawing/2014/main" id="{9E69EAED-464E-BBBF-03FD-FD2E1A0F0824}"/>
+              </a:ext>
+            </a:extLst>
+          </p:cNvPr>
+          <p:cNvSpPr>
+            <a:spLocks noGrp="1"/>
+          </p:cNvSpPr>
+          <p:nvPr>
+            <p:ph type="body" sz="quarter" idx="10"/>
+          </p:nvPr>
+        </p:nvSpPr>
+        <p:spPr>
+          <a:xfrm>
+            <a:off x="1362375" y="1992193"/>
+            <a:ext cx="9903723" cy="3986576"/>
+          </a:xfrm>
+        </p:spPr>
+        <p:txBody>
+          <a:bodyPr/>
+          <a:lstStyle/>
+          <a:p>
+            <a:endParaRPr lang="en-US" sz="3200" dirty="0"/>
+          </a:p>
+        </p:txBody>
+      </p:sp>
+      <p:sp>
+        <p:nvSpPr>
+          <p:cNvPr id="5" name="TextBox 4">
+            <a:extLst>
+              <a:ext uri="{FF2B5EF4-FFF2-40B4-BE49-F238E27FC236}">
+                <a16:creationId xmlns:a16="http://schemas.microsoft.com/office/drawing/2014/main" id="{DDC53EED-D8A2-EFE1-6513-7970D2E231E3}"/>
+              </a:ext>
+            </a:extLst>
+          </p:cNvPr>
+          <p:cNvSpPr txBox="1"/>
+          <p:nvPr/>
+        </p:nvSpPr>
+        <p:spPr>
+          <a:xfrm>
+            <a:off x="1411586" y="879231"/>
+            <a:ext cx="9368828" cy="830997"/>
+          </a:xfrm>
+          <a:prstGeom prst="rect">
+            <a:avLst/>
+          </a:prstGeom>
+          <a:noFill/>
+        </p:spPr>
+        <p:txBody>
+          <a:bodyPr wrap="square" rtlCol="0">
+            <a:spAutoFit/>
+          </a:bodyPr>
+          <a:lstStyle>
+            <a:defPPr>
+              <a:defRPr lang="en-US"/>
+            </a:defPPr>
+            <a:lvl1pPr algn="ctr">
+              <a:tabLst>
+                <a:tab pos="3835400" algn="l"/>
+              </a:tabLst>
+              <a:defRPr sz="18000" b="1">
+                <a:solidFill>
+                  <a:schemeClr val="bg1"/>
+                </a:solidFill>
+                <a:latin typeface="Space Grotesk" pitchFamily="2" charset="0"/>
+                <a:cs typeface="Space Grotesk" pitchFamily="2" charset="0"/>
+              </a:defRPr>
+            </a:lvl1pPr>
+          </a:lstStyle>
+          <a:p>
+            <a:pPr algn="l"/>
+            <a:r>
+              <a:rPr lang="en-US" sz="4800" dirty="0">
+                <a:gradFill>
+                  <a:gsLst>
+                    <a:gs pos="0">
+                      <a:schemeClr val="accent1"/>
+                    </a:gs>
+                    <a:gs pos="100000">
+                      <a:schemeClr val="accent2"/>
+                    </a:gs>
+                  </a:gsLst>
+                  <a:lin ang="0" scaled="0"/>
+                </a:gradFill>
+              </a:rPr>
+              <a:t>Title</a:t>
+            </a:r>
+          </a:p>
+        </p:txBody>
+      </p:sp>
+    </p:spTree>
+    <p:extLst>
+      <p:ext uri="{BB962C8B-B14F-4D97-AF65-F5344CB8AC3E}">
+        <p14:creationId xmlns:p14="http://schemas.microsoft.com/office/powerpoint/2010/main" val="1112398247"/>
+      </p:ext>
+    </p:extLst>
+  </p:cSld>
+  <p:clrMapOvr>
+    <a:masterClrMapping/>
+  </p:clrMapOvr>
+</p:sld>
+</file>
+
+<file path=ppt/slides/slide11.xml><?xml version="1.0" encoding="utf-8"?>
+<p:sld xmlns:a="http://schemas.openxmlformats.org/drawingml/2006/main" xmlns:r="http://schemas.openxmlformats.org/officeDocument/2006/relationships" xmlns:p="http://schemas.openxmlformats.org/presentationml/2006/main">
+  <p:cSld>
+    <p:spTree>
+      <p:nvGrpSpPr>
+        <p:cNvPr id="1" name=""/>
+        <p:cNvGrpSpPr/>
+        <p:nvPr/>
+      </p:nvGrpSpPr>
+      <p:grpSpPr>
+        <a:xfrm>
+          <a:off x="0" y="0"/>
+          <a:ext cx="0" cy="0"/>
+          <a:chOff x="0" y="0"/>
+          <a:chExt cx="0" cy="0"/>
+        </a:xfrm>
+      </p:grpSpPr>
+      <p:sp>
+        <p:nvSpPr>
+          <p:cNvPr id="4" name="Text Placeholder 3">
+            <a:extLst>
+              <a:ext uri="{FF2B5EF4-FFF2-40B4-BE49-F238E27FC236}">
+                <a16:creationId xmlns:a16="http://schemas.microsoft.com/office/drawing/2014/main" id="{9E69EAED-464E-BBBF-03FD-FD2E1A0F0824}"/>
+              </a:ext>
+            </a:extLst>
+          </p:cNvPr>
+          <p:cNvSpPr>
+            <a:spLocks noGrp="1"/>
+          </p:cNvSpPr>
+          <p:nvPr>
+            <p:ph type="body" sz="quarter" idx="10"/>
+          </p:nvPr>
+        </p:nvSpPr>
+        <p:spPr>
+          <a:xfrm>
+            <a:off x="1362375" y="1992193"/>
+            <a:ext cx="9903723" cy="3986576"/>
+          </a:xfrm>
+        </p:spPr>
+        <p:txBody>
+          <a:bodyPr/>
+          <a:lstStyle/>
+          <a:p>
+            <a:r>
+              <a:rPr lang="en-US" sz="3200" dirty="0"/>
+              <a:t>A list of all the reasons why to use pipelines</a:t>
+            </a:r>
+          </a:p>
+        </p:txBody>
+      </p:sp>
+      <p:sp>
+        <p:nvSpPr>
+          <p:cNvPr id="5" name="TextBox 4">
+            <a:extLst>
+              <a:ext uri="{FF2B5EF4-FFF2-40B4-BE49-F238E27FC236}">
+                <a16:creationId xmlns:a16="http://schemas.microsoft.com/office/drawing/2014/main" id="{DDC53EED-D8A2-EFE1-6513-7970D2E231E3}"/>
+              </a:ext>
+            </a:extLst>
+          </p:cNvPr>
+          <p:cNvSpPr txBox="1"/>
+          <p:nvPr/>
+        </p:nvSpPr>
+        <p:spPr>
+          <a:xfrm>
+            <a:off x="1411586" y="879231"/>
+            <a:ext cx="9368828" cy="830997"/>
+          </a:xfrm>
+          <a:prstGeom prst="rect">
+            <a:avLst/>
+          </a:prstGeom>
+          <a:noFill/>
+        </p:spPr>
+        <p:txBody>
+          <a:bodyPr wrap="square" rtlCol="0">
+            <a:spAutoFit/>
+          </a:bodyPr>
+          <a:lstStyle>
+            <a:defPPr>
+              <a:defRPr lang="en-US"/>
+            </a:defPPr>
+            <a:lvl1pPr algn="ctr">
+              <a:tabLst>
+                <a:tab pos="3835400" algn="l"/>
+              </a:tabLst>
+              <a:defRPr sz="18000" b="1">
+                <a:solidFill>
+                  <a:schemeClr val="bg1"/>
+                </a:solidFill>
+                <a:latin typeface="Space Grotesk" pitchFamily="2" charset="0"/>
+                <a:cs typeface="Space Grotesk" pitchFamily="2" charset="0"/>
+              </a:defRPr>
+            </a:lvl1pPr>
+          </a:lstStyle>
+          <a:p>
+            <a:pPr algn="l"/>
+            <a:r>
+              <a:rPr lang="en-US" sz="4800" dirty="0">
+                <a:gradFill>
+                  <a:gsLst>
+                    <a:gs pos="0">
+                      <a:schemeClr val="accent1"/>
+                    </a:gs>
+                    <a:gs pos="100000">
+                      <a:schemeClr val="accent2"/>
+                    </a:gs>
+                  </a:gsLst>
+                  <a:lin ang="0" scaled="0"/>
+                </a:gradFill>
+              </a:rPr>
+              <a:t>Recap</a:t>
+            </a:r>
+          </a:p>
+        </p:txBody>
+      </p:sp>
+    </p:spTree>
+    <p:extLst>
+      <p:ext uri="{BB962C8B-B14F-4D97-AF65-F5344CB8AC3E}">
+        <p14:creationId xmlns:p14="http://schemas.microsoft.com/office/powerpoint/2010/main" val="1045744949"/>
+      </p:ext>
+    </p:extLst>
+  </p:cSld>
+  <p:clrMapOvr>
+    <a:masterClrMapping/>
+  </p:clrMapOvr>
+</p:sld>
+</file>
+
+<file path=ppt/slides/slide12.xml><?xml version="1.0" encoding="utf-8"?>
+<p:sld xmlns:a="http://schemas.openxmlformats.org/drawingml/2006/main" xmlns:r="http://schemas.openxmlformats.org/officeDocument/2006/relationships" xmlns:p="http://schemas.openxmlformats.org/presentationml/2006/main">
+  <p:cSld>
+    <p:spTree>
+      <p:nvGrpSpPr>
+        <p:cNvPr id="1" name=""/>
+        <p:cNvGrpSpPr/>
+        <p:nvPr/>
+      </p:nvGrpSpPr>
+      <p:grpSpPr>
+        <a:xfrm>
+          <a:off x="0" y="0"/>
+          <a:ext cx="0" cy="0"/>
+          <a:chOff x="0" y="0"/>
+          <a:chExt cx="0" cy="0"/>
+        </a:xfrm>
+      </p:grpSpPr>
+      <p:sp>
+        <p:nvSpPr>
+          <p:cNvPr id="2" name="TextBox 1">
+            <a:extLst>
+              <a:ext uri="{FF2B5EF4-FFF2-40B4-BE49-F238E27FC236}">
+                <a16:creationId xmlns:a16="http://schemas.microsoft.com/office/drawing/2014/main" id="{ED95610F-322B-4DD1-8AA0-F9773EDD4C17}"/>
+              </a:ext>
+            </a:extLst>
+          </p:cNvPr>
+          <p:cNvSpPr txBox="1"/>
+          <p:nvPr/>
+        </p:nvSpPr>
+        <p:spPr>
+          <a:xfrm>
+            <a:off x="1411586" y="411451"/>
+            <a:ext cx="9368828" cy="2015936"/>
+          </a:xfrm>
+          <a:prstGeom prst="rect">
+            <a:avLst/>
+          </a:prstGeom>
+          <a:noFill/>
+        </p:spPr>
+        <p:txBody>
+          <a:bodyPr wrap="square" rtlCol="0">
+            <a:spAutoFit/>
+          </a:bodyPr>
+          <a:lstStyle>
+            <a:defPPr>
+              <a:defRPr lang="en-US"/>
+            </a:defPPr>
+            <a:lvl1pPr algn="ctr">
+              <a:tabLst>
+                <a:tab pos="3835400" algn="l"/>
+              </a:tabLst>
+              <a:defRPr sz="18000" b="1">
+                <a:solidFill>
+                  <a:schemeClr val="bg1"/>
+                </a:solidFill>
+                <a:latin typeface="Space Grotesk" pitchFamily="2" charset="0"/>
+                <a:cs typeface="Space Grotesk" pitchFamily="2" charset="0"/>
+              </a:defRPr>
+            </a:lvl1pPr>
+          </a:lstStyle>
+          <a:p>
+            <a:r>
+              <a:rPr lang="en-US" sz="12500" dirty="0">
+                <a:gradFill>
+                  <a:gsLst>
+                    <a:gs pos="0">
+                      <a:schemeClr val="accent1"/>
+                    </a:gs>
+                    <a:gs pos="100000">
+                      <a:schemeClr val="accent2"/>
+                    </a:gs>
+                  </a:gsLst>
+                  <a:lin ang="0" scaled="0"/>
+                </a:gradFill>
+              </a:rPr>
+              <a:t>THANK YOU</a:t>
+            </a:r>
+          </a:p>
+        </p:txBody>
+      </p:sp>
+      <p:sp>
+        <p:nvSpPr>
+          <p:cNvPr id="7" name="TextBox 6">
+            <a:extLst>
+              <a:ext uri="{FF2B5EF4-FFF2-40B4-BE49-F238E27FC236}">
+                <a16:creationId xmlns:a16="http://schemas.microsoft.com/office/drawing/2014/main" id="{243C9207-59EB-04DC-C4D8-A685A328FC4D}"/>
+              </a:ext>
+            </a:extLst>
+          </p:cNvPr>
+          <p:cNvSpPr txBox="1"/>
+          <p:nvPr/>
+        </p:nvSpPr>
+        <p:spPr>
+          <a:xfrm>
+            <a:off x="3363958" y="2333592"/>
+            <a:ext cx="5377269" cy="456407"/>
+          </a:xfrm>
+          <a:prstGeom prst="rect">
+            <a:avLst/>
+          </a:prstGeom>
+          <a:noFill/>
+        </p:spPr>
+        <p:txBody>
+          <a:bodyPr wrap="square" rtlCol="0">
+            <a:spAutoFit/>
+          </a:bodyPr>
+          <a:lstStyle/>
+          <a:p>
+            <a:pPr algn="ctr">
+              <a:lnSpc>
+                <a:spcPts val="2800"/>
+              </a:lnSpc>
+            </a:pPr>
+            <a:r>
+              <a:rPr lang="en-US" sz="2800" b="1" spc="400" dirty="0">
+                <a:solidFill>
+                  <a:schemeClr val="bg1"/>
+                </a:solidFill>
+                <a:latin typeface="Play" panose="00000500000000000000" pitchFamily="2" charset="0"/>
+                <a:cs typeface="Space Grotesk" pitchFamily="2" charset="0"/>
+              </a:rPr>
+              <a:t>Please review this session</a:t>
+            </a:r>
+          </a:p>
+        </p:txBody>
+      </p:sp>
+      <p:pic>
+        <p:nvPicPr>
+          <p:cNvPr id="6" name="Picture 5" descr="A qr code on a screen&#10;&#10;Description automatically generated">
+            <a:extLst>
+              <a:ext uri="{FF2B5EF4-FFF2-40B4-BE49-F238E27FC236}">
+                <a16:creationId xmlns:a16="http://schemas.microsoft.com/office/drawing/2014/main" id="{8F760940-8BAB-7607-94F5-F5264399088D}"/>
+              </a:ext>
+            </a:extLst>
+          </p:cNvPr>
+          <p:cNvPicPr>
+            <a:picLocks noChangeAspect="1"/>
+          </p:cNvPicPr>
+          <p:nvPr/>
+        </p:nvPicPr>
+        <p:blipFill>
+          <a:blip r:embed="rId2"/>
+          <a:stretch>
+            <a:fillRect/>
+          </a:stretch>
+        </p:blipFill>
+        <p:spPr>
+          <a:xfrm>
+            <a:off x="4996915" y="3416968"/>
+            <a:ext cx="2198170" cy="2930893"/>
+          </a:xfrm>
+          <a:prstGeom prst="rect">
+            <a:avLst/>
+          </a:prstGeom>
+        </p:spPr>
+      </p:pic>
+      <p:sp>
+        <p:nvSpPr>
+          <p:cNvPr id="3" name="TextBox 2">
+            <a:extLst>
+              <a:ext uri="{FF2B5EF4-FFF2-40B4-BE49-F238E27FC236}">
+                <a16:creationId xmlns:a16="http://schemas.microsoft.com/office/drawing/2014/main" id="{78073C81-28FB-79A8-18B9-AFBC57BD38DC}"/>
+              </a:ext>
+            </a:extLst>
+          </p:cNvPr>
+          <p:cNvSpPr txBox="1"/>
+          <p:nvPr/>
+        </p:nvSpPr>
+        <p:spPr>
+          <a:xfrm>
+            <a:off x="8654453" y="3338315"/>
+            <a:ext cx="3085460" cy="1508105"/>
+          </a:xfrm>
+          <a:prstGeom prst="rect">
+            <a:avLst/>
+          </a:prstGeom>
+          <a:noFill/>
+        </p:spPr>
+        <p:txBody>
+          <a:bodyPr wrap="none" rtlCol="0">
+            <a:spAutoFit/>
+          </a:bodyPr>
+          <a:lstStyle/>
+          <a:p>
+            <a:r>
+              <a:rPr lang="en-US" sz="2400" dirty="0">
+                <a:solidFill>
+                  <a:schemeClr val="bg1"/>
+                </a:solidFill>
+              </a:rPr>
+              <a:t>twitter.com/</a:t>
+            </a:r>
+            <a:r>
+              <a:rPr lang="en-US" sz="2400" dirty="0" err="1">
+                <a:solidFill>
+                  <a:schemeClr val="bg1"/>
+                </a:solidFill>
+              </a:rPr>
+              <a:t>deadlydog</a:t>
+            </a:r>
+            <a:endParaRPr lang="en-US" sz="2400" dirty="0">
+              <a:solidFill>
+                <a:schemeClr val="bg1"/>
+              </a:solidFill>
+            </a:endParaRPr>
+          </a:p>
+          <a:p>
+            <a:endParaRPr lang="en-US" sz="1000" dirty="0">
+              <a:solidFill>
+                <a:schemeClr val="bg1"/>
+              </a:solidFill>
+            </a:endParaRPr>
+          </a:p>
+          <a:p>
+            <a:r>
+              <a:rPr lang="en-US" sz="2400" dirty="0">
+                <a:solidFill>
+                  <a:schemeClr val="bg1"/>
+                </a:solidFill>
+              </a:rPr>
+              <a:t>github.com/</a:t>
+            </a:r>
+            <a:r>
+              <a:rPr lang="en-US" sz="2400" dirty="0" err="1">
+                <a:solidFill>
+                  <a:schemeClr val="bg1"/>
+                </a:solidFill>
+              </a:rPr>
+              <a:t>deadlydog</a:t>
+            </a:r>
+            <a:endParaRPr lang="en-US" sz="2400" dirty="0">
+              <a:solidFill>
+                <a:schemeClr val="bg1"/>
+              </a:solidFill>
+            </a:endParaRPr>
+          </a:p>
+          <a:p>
+            <a:endParaRPr lang="en-US" sz="1000" dirty="0">
+              <a:solidFill>
+                <a:schemeClr val="bg1"/>
+              </a:solidFill>
+            </a:endParaRPr>
+          </a:p>
+          <a:p>
+            <a:r>
+              <a:rPr lang="en-US" sz="2400" dirty="0">
+                <a:solidFill>
+                  <a:schemeClr val="bg1"/>
+                </a:solidFill>
+              </a:rPr>
+              <a:t>blog.danskingdom.com</a:t>
+            </a:r>
+          </a:p>
+        </p:txBody>
+      </p:sp>
+      <p:pic>
+        <p:nvPicPr>
+          <p:cNvPr id="5" name="Picture 4" descr="A blue bird with black background&#10;&#10;Description automatically generated">
+            <a:extLst>
+              <a:ext uri="{FF2B5EF4-FFF2-40B4-BE49-F238E27FC236}">
+                <a16:creationId xmlns:a16="http://schemas.microsoft.com/office/drawing/2014/main" id="{C2575A0D-5936-48E1-E3B5-E5CF9C77E3FD}"/>
+              </a:ext>
+            </a:extLst>
+          </p:cNvPr>
+          <p:cNvPicPr>
+            <a:picLocks noChangeAspect="1"/>
+          </p:cNvPicPr>
+          <p:nvPr/>
+        </p:nvPicPr>
+        <p:blipFill>
+          <a:blip r:embed="rId3"/>
+          <a:stretch>
+            <a:fillRect/>
+          </a:stretch>
+        </p:blipFill>
+        <p:spPr>
+          <a:xfrm>
+            <a:off x="8222411" y="3427775"/>
+            <a:ext cx="422043" cy="347156"/>
+          </a:xfrm>
+          <a:prstGeom prst="rect">
+            <a:avLst/>
+          </a:prstGeom>
+        </p:spPr>
+      </p:pic>
+      <p:pic>
+        <p:nvPicPr>
+          <p:cNvPr id="9" name="Picture 8" descr="A black background with a black square&#10;&#10;Description automatically generated with medium confidence">
+            <a:extLst>
+              <a:ext uri="{FF2B5EF4-FFF2-40B4-BE49-F238E27FC236}">
+                <a16:creationId xmlns:a16="http://schemas.microsoft.com/office/drawing/2014/main" id="{89450F6B-D345-6875-57C0-CF5D8C8E9EE8}"/>
+              </a:ext>
+            </a:extLst>
+          </p:cNvPr>
+          <p:cNvPicPr>
+            <a:picLocks noChangeAspect="1"/>
+          </p:cNvPicPr>
+          <p:nvPr/>
+        </p:nvPicPr>
+        <p:blipFill>
+          <a:blip r:embed="rId4"/>
+          <a:stretch>
+            <a:fillRect/>
+          </a:stretch>
+        </p:blipFill>
+        <p:spPr>
+          <a:xfrm>
+            <a:off x="8222411" y="3880035"/>
+            <a:ext cx="432042" cy="432042"/>
+          </a:xfrm>
+          <a:prstGeom prst="rect">
+            <a:avLst/>
+          </a:prstGeom>
+        </p:spPr>
+      </p:pic>
+      <p:pic>
+        <p:nvPicPr>
+          <p:cNvPr id="11" name="Picture 10" descr="A blue and black logo&#10;&#10;Description automatically generated">
+            <a:extLst>
+              <a:ext uri="{FF2B5EF4-FFF2-40B4-BE49-F238E27FC236}">
+                <a16:creationId xmlns:a16="http://schemas.microsoft.com/office/drawing/2014/main" id="{5B35F094-B54F-D99C-D781-7E063469F2CC}"/>
+              </a:ext>
+            </a:extLst>
+          </p:cNvPr>
+          <p:cNvPicPr>
+            <a:picLocks noChangeAspect="1"/>
+          </p:cNvPicPr>
+          <p:nvPr/>
+        </p:nvPicPr>
+        <p:blipFill>
+          <a:blip r:embed="rId5"/>
+          <a:stretch>
+            <a:fillRect/>
+          </a:stretch>
+        </p:blipFill>
+        <p:spPr>
+          <a:xfrm>
+            <a:off x="8086766" y="4312077"/>
+            <a:ext cx="654461" cy="654461"/>
+          </a:xfrm>
+          <a:prstGeom prst="rect">
+            <a:avLst/>
+          </a:prstGeom>
+        </p:spPr>
+      </p:pic>
+    </p:spTree>
+    <p:extLst>
+      <p:ext uri="{BB962C8B-B14F-4D97-AF65-F5344CB8AC3E}">
+        <p14:creationId xmlns:p14="http://schemas.microsoft.com/office/powerpoint/2010/main" val="194438742"/>
+      </p:ext>
+    </p:extLst>
+  </p:cSld>
+  <p:clrMapOvr>
+    <a:masterClrMapping/>
+  </p:clrMapOvr>
+</p:sld>
+</file>
+
+<file path=ppt/slides/slide13.xml><?xml version="1.0" encoding="utf-8"?>
+<p:sld xmlns:a="http://schemas.openxmlformats.org/drawingml/2006/main" xmlns:r="http://schemas.openxmlformats.org/officeDocument/2006/relationships" xmlns:p="http://schemas.openxmlformats.org/presentationml/2006/main">
+  <p:cSld>
+    <p:spTree>
+      <p:nvGrpSpPr>
+        <p:cNvPr id="1" name=""/>
+        <p:cNvGrpSpPr/>
+        <p:nvPr/>
+      </p:nvGrpSpPr>
+      <p:grpSpPr>
+        <a:xfrm>
+          <a:off x="0" y="0"/>
+          <a:ext cx="0" cy="0"/>
+          <a:chOff x="0" y="0"/>
+          <a:chExt cx="0" cy="0"/>
+        </a:xfrm>
+      </p:grpSpPr>
+      <p:sp>
+        <p:nvSpPr>
+          <p:cNvPr id="4" name="Text Placeholder 3">
+            <a:extLst>
+              <a:ext uri="{FF2B5EF4-FFF2-40B4-BE49-F238E27FC236}">
+                <a16:creationId xmlns:a16="http://schemas.microsoft.com/office/drawing/2014/main" id="{9E69EAED-464E-BBBF-03FD-FD2E1A0F0824}"/>
+              </a:ext>
+            </a:extLst>
+          </p:cNvPr>
+          <p:cNvSpPr>
+            <a:spLocks noGrp="1"/>
+          </p:cNvSpPr>
+          <p:nvPr>
+            <p:ph type="body" sz="quarter" idx="10"/>
+          </p:nvPr>
+        </p:nvSpPr>
+        <p:spPr>
+          <a:xfrm>
+            <a:off x="1362375" y="1992193"/>
+            <a:ext cx="9903723" cy="3986576"/>
+          </a:xfrm>
+        </p:spPr>
+        <p:txBody>
+          <a:bodyPr/>
+          <a:lstStyle/>
+          <a:p>
+            <a:endParaRPr lang="en-US" sz="3200" dirty="0"/>
+          </a:p>
+        </p:txBody>
+      </p:sp>
+      <p:sp>
+        <p:nvSpPr>
+          <p:cNvPr id="5" name="TextBox 4">
+            <a:extLst>
+              <a:ext uri="{FF2B5EF4-FFF2-40B4-BE49-F238E27FC236}">
+                <a16:creationId xmlns:a16="http://schemas.microsoft.com/office/drawing/2014/main" id="{DDC53EED-D8A2-EFE1-6513-7970D2E231E3}"/>
+              </a:ext>
+            </a:extLst>
+          </p:cNvPr>
+          <p:cNvSpPr txBox="1"/>
+          <p:nvPr/>
+        </p:nvSpPr>
+        <p:spPr>
+          <a:xfrm>
+            <a:off x="1411586" y="879231"/>
+            <a:ext cx="9368828" cy="830997"/>
+          </a:xfrm>
+          <a:prstGeom prst="rect">
+            <a:avLst/>
+          </a:prstGeom>
+          <a:noFill/>
+        </p:spPr>
+        <p:txBody>
+          <a:bodyPr wrap="square" rtlCol="0">
+            <a:spAutoFit/>
+          </a:bodyPr>
+          <a:lstStyle>
+            <a:defPPr>
+              <a:defRPr lang="en-US"/>
+            </a:defPPr>
+            <a:lvl1pPr algn="ctr">
+              <a:tabLst>
+                <a:tab pos="3835400" algn="l"/>
+              </a:tabLst>
+              <a:defRPr sz="18000" b="1">
+                <a:solidFill>
+                  <a:schemeClr val="bg1"/>
+                </a:solidFill>
+                <a:latin typeface="Space Grotesk" pitchFamily="2" charset="0"/>
+                <a:cs typeface="Space Grotesk" pitchFamily="2" charset="0"/>
+              </a:defRPr>
+            </a:lvl1pPr>
+          </a:lstStyle>
+          <a:p>
+            <a:pPr algn="l"/>
+            <a:r>
+              <a:rPr lang="en-US" sz="4800" dirty="0">
+                <a:gradFill>
+                  <a:gsLst>
+                    <a:gs pos="0">
+                      <a:schemeClr val="accent1"/>
+                    </a:gs>
+                    <a:gs pos="100000">
+                      <a:schemeClr val="accent2"/>
+                    </a:gs>
+                  </a:gsLst>
+                  <a:lin ang="0" scaled="0"/>
+                </a:gradFill>
+              </a:rPr>
+              <a:t>Heading</a:t>
+            </a:r>
+          </a:p>
+        </p:txBody>
+      </p:sp>
+    </p:spTree>
+    <p:extLst>
+      <p:ext uri="{BB962C8B-B14F-4D97-AF65-F5344CB8AC3E}">
+        <p14:creationId xmlns:p14="http://schemas.microsoft.com/office/powerpoint/2010/main" val="1764268837"/>
       </p:ext>
     </p:extLst>
   </p:cSld>
@@ -16802,9 +17952,33 @@
             <a:off x="5971291" y="454217"/>
             <a:ext cx="4261769" cy="3196327"/>
           </a:xfrm>
-          <a:prstGeom prst="rect">
+          <a:prstGeom prst="ellipse">
             <a:avLst/>
           </a:prstGeom>
+          <a:ln w="63500" cap="rnd">
+            <a:solidFill>
+              <a:srgbClr val="333333"/>
+            </a:solidFill>
+          </a:ln>
+          <a:effectLst>
+            <a:outerShdw blurRad="381000" dist="292100" dir="5400000" sx="-80000" sy="-18000" rotWithShape="0">
+              <a:srgbClr val="000000">
+                <a:alpha val="22000"/>
+              </a:srgbClr>
+            </a:outerShdw>
+          </a:effectLst>
+          <a:scene3d>
+            <a:camera prst="orthographicFront"/>
+            <a:lightRig rig="contrasting" dir="t">
+              <a:rot lat="0" lon="0" rev="3000000"/>
+            </a:lightRig>
+          </a:scene3d>
+          <a:sp3d contourW="7620">
+            <a:bevelT w="95250" h="31750"/>
+            <a:contourClr>
+              <a:srgbClr val="333333"/>
+            </a:contourClr>
+          </a:sp3d>
         </p:spPr>
       </p:pic>
     </p:spTree>
@@ -16821,6 +17995,656 @@
 </file>
 
 <file path=ppt/slides/slide4.xml><?xml version="1.0" encoding="utf-8"?>
+<p:sld xmlns:a="http://schemas.openxmlformats.org/drawingml/2006/main" xmlns:r="http://schemas.openxmlformats.org/officeDocument/2006/relationships" xmlns:p="http://schemas.openxmlformats.org/presentationml/2006/main">
+  <p:cSld>
+    <p:spTree>
+      <p:nvGrpSpPr>
+        <p:cNvPr id="1" name=""/>
+        <p:cNvGrpSpPr/>
+        <p:nvPr/>
+      </p:nvGrpSpPr>
+      <p:grpSpPr>
+        <a:xfrm>
+          <a:off x="0" y="0"/>
+          <a:ext cx="0" cy="0"/>
+          <a:chOff x="0" y="0"/>
+          <a:chExt cx="0" cy="0"/>
+        </a:xfrm>
+      </p:grpSpPr>
+      <p:pic>
+        <p:nvPicPr>
+          <p:cNvPr id="3" name="Picture 2">
+            <a:extLst>
+              <a:ext uri="{FF2B5EF4-FFF2-40B4-BE49-F238E27FC236}">
+                <a16:creationId xmlns:a16="http://schemas.microsoft.com/office/drawing/2014/main" id="{88346CD4-09DF-B23F-CBF2-F254C9DCB2D0}"/>
+              </a:ext>
+            </a:extLst>
+          </p:cNvPr>
+          <p:cNvPicPr>
+            <a:picLocks noChangeAspect="1"/>
+          </p:cNvPicPr>
+          <p:nvPr/>
+        </p:nvPicPr>
+        <p:blipFill>
+          <a:blip r:embed="rId3"/>
+          <a:stretch>
+            <a:fillRect/>
+          </a:stretch>
+        </p:blipFill>
+        <p:spPr>
+          <a:xfrm>
+            <a:off x="81901" y="132848"/>
+            <a:ext cx="11658357" cy="6592304"/>
+          </a:xfrm>
+          <a:prstGeom prst="rect">
+            <a:avLst/>
+          </a:prstGeom>
+        </p:spPr>
+      </p:pic>
+      <p:pic>
+        <p:nvPicPr>
+          <p:cNvPr id="7" name="Picture 6">
+            <a:extLst>
+              <a:ext uri="{FF2B5EF4-FFF2-40B4-BE49-F238E27FC236}">
+                <a16:creationId xmlns:a16="http://schemas.microsoft.com/office/drawing/2014/main" id="{505EC2B6-0BF3-92AB-33BF-A325DE86E8F7}"/>
+              </a:ext>
+            </a:extLst>
+          </p:cNvPr>
+          <p:cNvPicPr>
+            <a:picLocks noChangeAspect="1"/>
+          </p:cNvPicPr>
+          <p:nvPr/>
+        </p:nvPicPr>
+        <p:blipFill>
+          <a:blip r:embed="rId4"/>
+          <a:stretch>
+            <a:fillRect/>
+          </a:stretch>
+        </p:blipFill>
+        <p:spPr>
+          <a:xfrm>
+            <a:off x="347149" y="277937"/>
+            <a:ext cx="11762950" cy="4633110"/>
+          </a:xfrm>
+          <a:prstGeom prst="rect">
+            <a:avLst/>
+          </a:prstGeom>
+        </p:spPr>
+      </p:pic>
+    </p:spTree>
+    <p:extLst>
+      <p:ext uri="{BB962C8B-B14F-4D97-AF65-F5344CB8AC3E}">
+        <p14:creationId xmlns:p14="http://schemas.microsoft.com/office/powerpoint/2010/main" val="941066589"/>
+      </p:ext>
+    </p:extLst>
+  </p:cSld>
+  <p:clrMapOvr>
+    <a:masterClrMapping/>
+  </p:clrMapOvr>
+  <p:timing>
+    <p:tnLst>
+      <p:par>
+        <p:cTn id="1" dur="indefinite" restart="never" nodeType="tmRoot">
+          <p:childTnLst>
+            <p:seq concurrent="1" nextAc="seek">
+              <p:cTn id="2" dur="indefinite" nodeType="mainSeq">
+                <p:childTnLst>
+                  <p:par>
+                    <p:cTn id="3" fill="hold">
+                      <p:stCondLst>
+                        <p:cond delay="indefinite"/>
+                      </p:stCondLst>
+                      <p:childTnLst>
+                        <p:par>
+                          <p:cTn id="4" fill="hold">
+                            <p:stCondLst>
+                              <p:cond delay="0"/>
+                            </p:stCondLst>
+                            <p:childTnLst>
+                              <p:par>
+                                <p:cTn id="5" presetID="22" presetClass="entr" presetSubtype="8" fill="hold" nodeType="clickEffect">
+                                  <p:stCondLst>
+                                    <p:cond delay="0"/>
+                                  </p:stCondLst>
+                                  <p:childTnLst>
+                                    <p:set>
+                                      <p:cBhvr>
+                                        <p:cTn id="6" dur="1" fill="hold">
+                                          <p:stCondLst>
+                                            <p:cond delay="0"/>
+                                          </p:stCondLst>
+                                        </p:cTn>
+                                        <p:tgtEl>
+                                          <p:spTgt spid="7"/>
+                                        </p:tgtEl>
+                                        <p:attrNameLst>
+                                          <p:attrName>style.visibility</p:attrName>
+                                        </p:attrNameLst>
+                                      </p:cBhvr>
+                                      <p:to>
+                                        <p:strVal val="visible"/>
+                                      </p:to>
+                                    </p:set>
+                                    <p:animEffect transition="in" filter="wipe(left)">
+                                      <p:cBhvr>
+                                        <p:cTn id="7" dur="500"/>
+                                        <p:tgtEl>
+                                          <p:spTgt spid="7"/>
+                                        </p:tgtEl>
+                                      </p:cBhvr>
+                                    </p:animEffect>
+                                  </p:childTnLst>
+                                </p:cTn>
+                              </p:par>
+                            </p:childTnLst>
+                          </p:cTn>
+                        </p:par>
+                      </p:childTnLst>
+                    </p:cTn>
+                  </p:par>
+                </p:childTnLst>
+              </p:cTn>
+              <p:prevCondLst>
+                <p:cond evt="onPrev" delay="0">
+                  <p:tgtEl>
+                    <p:sldTgt/>
+                  </p:tgtEl>
+                </p:cond>
+              </p:prevCondLst>
+              <p:nextCondLst>
+                <p:cond evt="onNext" delay="0">
+                  <p:tgtEl>
+                    <p:sldTgt/>
+                  </p:tgtEl>
+                </p:cond>
+              </p:nextCondLst>
+            </p:seq>
+          </p:childTnLst>
+        </p:cTn>
+      </p:par>
+    </p:tnLst>
+  </p:timing>
+</p:sld>
+</file>
+
+<file path=ppt/slides/slide5.xml><?xml version="1.0" encoding="utf-8"?>
+<p:sld xmlns:a="http://schemas.openxmlformats.org/drawingml/2006/main" xmlns:r="http://schemas.openxmlformats.org/officeDocument/2006/relationships" xmlns:p="http://schemas.openxmlformats.org/presentationml/2006/main">
+  <p:cSld>
+    <p:spTree>
+      <p:nvGrpSpPr>
+        <p:cNvPr id="1" name="">
+          <a:extLst>
+            <a:ext uri="{FF2B5EF4-FFF2-40B4-BE49-F238E27FC236}">
+              <a16:creationId xmlns:a16="http://schemas.microsoft.com/office/drawing/2014/main" id="{E9A61DF6-1B2A-0591-F9CA-BB9C2A876328}"/>
+            </a:ext>
+          </a:extLst>
+        </p:cNvPr>
+        <p:cNvGrpSpPr/>
+        <p:nvPr/>
+      </p:nvGrpSpPr>
+      <p:grpSpPr>
+        <a:xfrm>
+          <a:off x="0" y="0"/>
+          <a:ext cx="0" cy="0"/>
+          <a:chOff x="0" y="0"/>
+          <a:chExt cx="0" cy="0"/>
+        </a:xfrm>
+      </p:grpSpPr>
+      <p:sp>
+        <p:nvSpPr>
+          <p:cNvPr id="4" name="Text Placeholder 3">
+            <a:extLst>
+              <a:ext uri="{FF2B5EF4-FFF2-40B4-BE49-F238E27FC236}">
+                <a16:creationId xmlns:a16="http://schemas.microsoft.com/office/drawing/2014/main" id="{1A6EB782-B082-899C-610F-54151924DCC0}"/>
+              </a:ext>
+            </a:extLst>
+          </p:cNvPr>
+          <p:cNvSpPr>
+            <a:spLocks noGrp="1"/>
+          </p:cNvSpPr>
+          <p:nvPr>
+            <p:ph type="body" sz="quarter" idx="10"/>
+          </p:nvPr>
+        </p:nvSpPr>
+        <p:spPr>
+          <a:xfrm>
+            <a:off x="1362375" y="1992193"/>
+            <a:ext cx="9903723" cy="3986576"/>
+          </a:xfrm>
+        </p:spPr>
+        <p:txBody>
+          <a:bodyPr/>
+          <a:lstStyle/>
+          <a:p>
+            <a:r>
+              <a:rPr lang="en-US" sz="3200" dirty="0"/>
+              <a:t>Why use modules?</a:t>
+            </a:r>
+          </a:p>
+          <a:p>
+            <a:r>
+              <a:rPr lang="en-US" sz="3200" dirty="0"/>
+              <a:t>Why automate publishing?</a:t>
+            </a:r>
+          </a:p>
+          <a:p>
+            <a:r>
+              <a:rPr lang="en-US" sz="3200" dirty="0"/>
+              <a:t>How to automate publishing?</a:t>
+            </a:r>
+          </a:p>
+          <a:p>
+            <a:r>
+              <a:rPr lang="en-US" sz="3200" dirty="0"/>
+              <a:t>Demo</a:t>
+            </a:r>
+          </a:p>
+        </p:txBody>
+      </p:sp>
+      <p:sp>
+        <p:nvSpPr>
+          <p:cNvPr id="5" name="TextBox 4">
+            <a:extLst>
+              <a:ext uri="{FF2B5EF4-FFF2-40B4-BE49-F238E27FC236}">
+                <a16:creationId xmlns:a16="http://schemas.microsoft.com/office/drawing/2014/main" id="{6D5DD03D-3200-A84E-680B-7A414D0FBEDD}"/>
+              </a:ext>
+            </a:extLst>
+          </p:cNvPr>
+          <p:cNvSpPr txBox="1"/>
+          <p:nvPr/>
+        </p:nvSpPr>
+        <p:spPr>
+          <a:xfrm>
+            <a:off x="1411586" y="879231"/>
+            <a:ext cx="9368828" cy="830997"/>
+          </a:xfrm>
+          <a:prstGeom prst="rect">
+            <a:avLst/>
+          </a:prstGeom>
+          <a:noFill/>
+        </p:spPr>
+        <p:txBody>
+          <a:bodyPr wrap="square" rtlCol="0">
+            <a:spAutoFit/>
+          </a:bodyPr>
+          <a:lstStyle>
+            <a:defPPr>
+              <a:defRPr lang="en-US"/>
+            </a:defPPr>
+            <a:lvl1pPr algn="ctr">
+              <a:tabLst>
+                <a:tab pos="3835400" algn="l"/>
+              </a:tabLst>
+              <a:defRPr sz="18000" b="1">
+                <a:solidFill>
+                  <a:schemeClr val="bg1"/>
+                </a:solidFill>
+                <a:latin typeface="Space Grotesk" pitchFamily="2" charset="0"/>
+                <a:cs typeface="Space Grotesk" pitchFamily="2" charset="0"/>
+              </a:defRPr>
+            </a:lvl1pPr>
+          </a:lstStyle>
+          <a:p>
+            <a:pPr algn="l"/>
+            <a:r>
+              <a:rPr lang="en-US" sz="4800" dirty="0">
+                <a:gradFill>
+                  <a:gsLst>
+                    <a:gs pos="0">
+                      <a:schemeClr val="accent1"/>
+                    </a:gs>
+                    <a:gs pos="100000">
+                      <a:schemeClr val="accent2"/>
+                    </a:gs>
+                  </a:gsLst>
+                  <a:lin ang="0" scaled="0"/>
+                </a:gradFill>
+              </a:rPr>
+              <a:t>Agenda</a:t>
+            </a:r>
+          </a:p>
+        </p:txBody>
+      </p:sp>
+    </p:spTree>
+    <p:extLst>
+      <p:ext uri="{BB962C8B-B14F-4D97-AF65-F5344CB8AC3E}">
+        <p14:creationId xmlns:p14="http://schemas.microsoft.com/office/powerpoint/2010/main" val="2709090844"/>
+      </p:ext>
+    </p:extLst>
+  </p:cSld>
+  <p:clrMapOvr>
+    <a:masterClrMapping/>
+  </p:clrMapOvr>
+</p:sld>
+</file>
+
+<file path=ppt/slides/slide6.xml><?xml version="1.0" encoding="utf-8"?>
+<p:sld xmlns:a="http://schemas.openxmlformats.org/drawingml/2006/main" xmlns:r="http://schemas.openxmlformats.org/officeDocument/2006/relationships" xmlns:p="http://schemas.openxmlformats.org/presentationml/2006/main">
+  <p:cSld>
+    <p:spTree>
+      <p:nvGrpSpPr>
+        <p:cNvPr id="1" name="">
+          <a:extLst>
+            <a:ext uri="{FF2B5EF4-FFF2-40B4-BE49-F238E27FC236}">
+              <a16:creationId xmlns:a16="http://schemas.microsoft.com/office/drawing/2014/main" id="{2779A058-DC31-3135-743D-2AE18E75C152}"/>
+            </a:ext>
+          </a:extLst>
+        </p:cNvPr>
+        <p:cNvGrpSpPr/>
+        <p:nvPr/>
+      </p:nvGrpSpPr>
+      <p:grpSpPr>
+        <a:xfrm>
+          <a:off x="0" y="0"/>
+          <a:ext cx="0" cy="0"/>
+          <a:chOff x="0" y="0"/>
+          <a:chExt cx="0" cy="0"/>
+        </a:xfrm>
+      </p:grpSpPr>
+      <p:sp>
+        <p:nvSpPr>
+          <p:cNvPr id="4" name="Text Placeholder 3">
+            <a:extLst>
+              <a:ext uri="{FF2B5EF4-FFF2-40B4-BE49-F238E27FC236}">
+                <a16:creationId xmlns:a16="http://schemas.microsoft.com/office/drawing/2014/main" id="{05CBD666-0C69-287F-8ED7-F79FAA8F43A0}"/>
+              </a:ext>
+            </a:extLst>
+          </p:cNvPr>
+          <p:cNvSpPr>
+            <a:spLocks noGrp="1"/>
+          </p:cNvSpPr>
+          <p:nvPr>
+            <p:ph type="body" sz="quarter" idx="10"/>
+          </p:nvPr>
+        </p:nvSpPr>
+        <p:spPr>
+          <a:xfrm>
+            <a:off x="1362375" y="1992193"/>
+            <a:ext cx="9903723" cy="3986576"/>
+          </a:xfrm>
+        </p:spPr>
+        <p:txBody>
+          <a:bodyPr/>
+          <a:lstStyle/>
+          <a:p>
+            <a:r>
+              <a:rPr lang="en-US" sz="3200" dirty="0"/>
+              <a:t>Easy to install</a:t>
+            </a:r>
+          </a:p>
+          <a:p>
+            <a:r>
+              <a:rPr lang="en-US" sz="3200" dirty="0"/>
+              <a:t>Easy to update</a:t>
+            </a:r>
+          </a:p>
+          <a:p>
+            <a:r>
+              <a:rPr lang="en-US" sz="3200" dirty="0"/>
+              <a:t>Easy to use</a:t>
+            </a:r>
+          </a:p>
+        </p:txBody>
+      </p:sp>
+      <p:sp>
+        <p:nvSpPr>
+          <p:cNvPr id="5" name="TextBox 4">
+            <a:extLst>
+              <a:ext uri="{FF2B5EF4-FFF2-40B4-BE49-F238E27FC236}">
+                <a16:creationId xmlns:a16="http://schemas.microsoft.com/office/drawing/2014/main" id="{E56D1F64-1859-D24E-9D18-5F74B5907274}"/>
+              </a:ext>
+            </a:extLst>
+          </p:cNvPr>
+          <p:cNvSpPr txBox="1"/>
+          <p:nvPr/>
+        </p:nvSpPr>
+        <p:spPr>
+          <a:xfrm>
+            <a:off x="1411586" y="879231"/>
+            <a:ext cx="9368828" cy="830997"/>
+          </a:xfrm>
+          <a:prstGeom prst="rect">
+            <a:avLst/>
+          </a:prstGeom>
+          <a:noFill/>
+        </p:spPr>
+        <p:txBody>
+          <a:bodyPr wrap="square" rtlCol="0">
+            <a:spAutoFit/>
+          </a:bodyPr>
+          <a:lstStyle>
+            <a:defPPr>
+              <a:defRPr lang="en-US"/>
+            </a:defPPr>
+            <a:lvl1pPr algn="ctr">
+              <a:tabLst>
+                <a:tab pos="3835400" algn="l"/>
+              </a:tabLst>
+              <a:defRPr sz="18000" b="1">
+                <a:solidFill>
+                  <a:schemeClr val="bg1"/>
+                </a:solidFill>
+                <a:latin typeface="Space Grotesk" pitchFamily="2" charset="0"/>
+                <a:cs typeface="Space Grotesk" pitchFamily="2" charset="0"/>
+              </a:defRPr>
+            </a:lvl1pPr>
+          </a:lstStyle>
+          <a:p>
+            <a:pPr algn="l"/>
+            <a:r>
+              <a:rPr lang="en-US" sz="4800" dirty="0">
+                <a:gradFill>
+                  <a:gsLst>
+                    <a:gs pos="0">
+                      <a:schemeClr val="accent1"/>
+                    </a:gs>
+                    <a:gs pos="100000">
+                      <a:schemeClr val="accent2"/>
+                    </a:gs>
+                  </a:gsLst>
+                  <a:lin ang="0" scaled="0"/>
+                </a:gradFill>
+              </a:rPr>
+              <a:t>Why use modules?</a:t>
+            </a:r>
+          </a:p>
+        </p:txBody>
+      </p:sp>
+    </p:spTree>
+    <p:extLst>
+      <p:ext uri="{BB962C8B-B14F-4D97-AF65-F5344CB8AC3E}">
+        <p14:creationId xmlns:p14="http://schemas.microsoft.com/office/powerpoint/2010/main" val="3499960018"/>
+      </p:ext>
+    </p:extLst>
+  </p:cSld>
+  <p:clrMapOvr>
+    <a:masterClrMapping/>
+  </p:clrMapOvr>
+</p:sld>
+</file>
+
+<file path=ppt/slides/slide7.xml><?xml version="1.0" encoding="utf-8"?>
+<p:sld xmlns:a="http://schemas.openxmlformats.org/drawingml/2006/main" xmlns:r="http://schemas.openxmlformats.org/officeDocument/2006/relationships" xmlns:p="http://schemas.openxmlformats.org/presentationml/2006/main">
+  <p:cSld>
+    <p:spTree>
+      <p:nvGrpSpPr>
+        <p:cNvPr id="1" name="">
+          <a:extLst>
+            <a:ext uri="{FF2B5EF4-FFF2-40B4-BE49-F238E27FC236}">
+              <a16:creationId xmlns:a16="http://schemas.microsoft.com/office/drawing/2014/main" id="{2D920EA5-FFB1-E956-E98D-6C34344D57A9}"/>
+            </a:ext>
+          </a:extLst>
+        </p:cNvPr>
+        <p:cNvGrpSpPr/>
+        <p:nvPr/>
+      </p:nvGrpSpPr>
+      <p:grpSpPr>
+        <a:xfrm>
+          <a:off x="0" y="0"/>
+          <a:ext cx="0" cy="0"/>
+          <a:chOff x="0" y="0"/>
+          <a:chExt cx="0" cy="0"/>
+        </a:xfrm>
+      </p:grpSpPr>
+      <p:sp>
+        <p:nvSpPr>
+          <p:cNvPr id="4" name="Text Placeholder 3">
+            <a:extLst>
+              <a:ext uri="{FF2B5EF4-FFF2-40B4-BE49-F238E27FC236}">
+                <a16:creationId xmlns:a16="http://schemas.microsoft.com/office/drawing/2014/main" id="{B0271C9D-52D7-FBBF-3522-AB344FAB3594}"/>
+              </a:ext>
+            </a:extLst>
+          </p:cNvPr>
+          <p:cNvSpPr>
+            <a:spLocks noGrp="1"/>
+          </p:cNvSpPr>
+          <p:nvPr>
+            <p:ph type="body" sz="quarter" idx="10"/>
+          </p:nvPr>
+        </p:nvSpPr>
+        <p:spPr>
+          <a:xfrm>
+            <a:off x="1362375" y="1992193"/>
+            <a:ext cx="9903723" cy="3986576"/>
+          </a:xfrm>
+        </p:spPr>
+        <p:txBody>
+          <a:bodyPr/>
+          <a:lstStyle/>
+          <a:p>
+            <a:pPr marL="0" indent="0">
+              <a:buNone/>
+            </a:pPr>
+            <a:r>
+              <a:rPr lang="en-US" sz="3200" dirty="0"/>
+              <a:t>1. Run commands in terminal </a:t>
+            </a:r>
+          </a:p>
+          <a:p>
+            <a:pPr marL="0" indent="0">
+              <a:buNone/>
+            </a:pPr>
+            <a:r>
+              <a:rPr lang="en-US" sz="3200" dirty="0"/>
+              <a:t>2. Put commands into a script </a:t>
+            </a:r>
+          </a:p>
+          <a:p>
+            <a:pPr marL="0" indent="0">
+              <a:buNone/>
+            </a:pPr>
+            <a:r>
+              <a:rPr lang="en-US" sz="3200" dirty="0"/>
+              <a:t>3. Put Params on script</a:t>
+            </a:r>
+          </a:p>
+          <a:p>
+            <a:pPr marL="0" indent="0">
+              <a:buNone/>
+            </a:pPr>
+            <a:r>
+              <a:rPr lang="en-US" sz="3200" dirty="0"/>
+              <a:t>4. Turn script into a module</a:t>
+            </a:r>
+          </a:p>
+          <a:p>
+            <a:pPr marL="0" indent="0">
+              <a:buNone/>
+            </a:pPr>
+            <a:endParaRPr lang="en-US" sz="3200" dirty="0"/>
+          </a:p>
+          <a:p>
+            <a:r>
+              <a:rPr lang="en-US" sz="3200" dirty="0"/>
+              <a:t>Migrating from scripts to modules is an iterative process</a:t>
+            </a:r>
+          </a:p>
+          <a:p>
+            <a:r>
+              <a:rPr lang="en-US" sz="3200" dirty="0"/>
+              <a:t>Not every script needs to be a module</a:t>
+            </a:r>
+          </a:p>
+        </p:txBody>
+      </p:sp>
+      <p:sp>
+        <p:nvSpPr>
+          <p:cNvPr id="5" name="TextBox 4">
+            <a:extLst>
+              <a:ext uri="{FF2B5EF4-FFF2-40B4-BE49-F238E27FC236}">
+                <a16:creationId xmlns:a16="http://schemas.microsoft.com/office/drawing/2014/main" id="{6CB122A9-923B-B454-32AE-4E07030D6FDE}"/>
+              </a:ext>
+            </a:extLst>
+          </p:cNvPr>
+          <p:cNvSpPr txBox="1"/>
+          <p:nvPr/>
+        </p:nvSpPr>
+        <p:spPr>
+          <a:xfrm>
+            <a:off x="1411586" y="879231"/>
+            <a:ext cx="9368828" cy="830997"/>
+          </a:xfrm>
+          <a:prstGeom prst="rect">
+            <a:avLst/>
+          </a:prstGeom>
+          <a:noFill/>
+        </p:spPr>
+        <p:txBody>
+          <a:bodyPr wrap="square" rtlCol="0">
+            <a:spAutoFit/>
+          </a:bodyPr>
+          <a:lstStyle>
+            <a:defPPr>
+              <a:defRPr lang="en-US"/>
+            </a:defPPr>
+            <a:lvl1pPr algn="ctr">
+              <a:tabLst>
+                <a:tab pos="3835400" algn="l"/>
+              </a:tabLst>
+              <a:defRPr sz="18000" b="1">
+                <a:solidFill>
+                  <a:schemeClr val="bg1"/>
+                </a:solidFill>
+                <a:latin typeface="Space Grotesk" pitchFamily="2" charset="0"/>
+                <a:cs typeface="Space Grotesk" pitchFamily="2" charset="0"/>
+              </a:defRPr>
+            </a:lvl1pPr>
+          </a:lstStyle>
+          <a:p>
+            <a:pPr algn="l"/>
+            <a:r>
+              <a:rPr lang="en-US" sz="4800" dirty="0">
+                <a:gradFill>
+                  <a:gsLst>
+                    <a:gs pos="0">
+                      <a:schemeClr val="accent1"/>
+                    </a:gs>
+                    <a:gs pos="100000">
+                      <a:schemeClr val="accent2"/>
+                    </a:gs>
+                  </a:gsLst>
+                  <a:lin ang="0" scaled="0"/>
+                </a:gradFill>
+              </a:rPr>
+              <a:t>From scripts to modules</a:t>
+            </a:r>
+          </a:p>
+        </p:txBody>
+      </p:sp>
+    </p:spTree>
+    <p:extLst>
+      <p:ext uri="{BB962C8B-B14F-4D97-AF65-F5344CB8AC3E}">
+        <p14:creationId xmlns:p14="http://schemas.microsoft.com/office/powerpoint/2010/main" val="3067221835"/>
+      </p:ext>
+    </p:extLst>
+  </p:cSld>
+  <p:clrMapOvr>
+    <a:masterClrMapping/>
+  </p:clrMapOvr>
+</p:sld>
+</file>
+
+<file path=ppt/slides/slide8.xml><?xml version="1.0" encoding="utf-8"?>
 <p:sld xmlns:a="http://schemas.openxmlformats.org/drawingml/2006/main" xmlns:r="http://schemas.openxmlformats.org/officeDocument/2006/relationships" xmlns:p="http://schemas.openxmlformats.org/presentationml/2006/main">
   <p:cSld>
     <p:spTree>
@@ -16863,7 +18687,24 @@
           <a:bodyPr/>
           <a:lstStyle/>
           <a:p>
-            <a:endParaRPr lang="en-US" dirty="0"/>
+            <a:r>
+              <a:rPr lang="en-US" sz="3200" dirty="0"/>
+              <a:t>Slides should be memes to exaggerate the point, then text afterward so the audience can see the point (accessibility, they can take pics, </a:t>
+            </a:r>
+            <a:r>
+              <a:rPr lang="en-US" sz="3200" dirty="0" err="1"/>
+              <a:t>etc</a:t>
+            </a:r>
+            <a:r>
+              <a:rPr lang="en-US" sz="3200" dirty="0"/>
+              <a:t>)</a:t>
+            </a:r>
+          </a:p>
+          <a:p>
+            <a:r>
+              <a:rPr lang="en-US" sz="3200" dirty="0"/>
+              <a:t>Put talking points in the Presenter Notes (even though won’t see them, will be useful for rehearsal and if I give the talk again later down the road)</a:t>
+            </a:r>
           </a:p>
         </p:txBody>
       </p:sp>
@@ -16926,7 +18767,7 @@
                   <a:lin ang="0" scaled="0"/>
                 </a:gradFill>
               </a:rPr>
-              <a:t>Agenda</a:t>
+              <a:t>Slide layout</a:t>
             </a:r>
           </a:p>
         </p:txBody>
@@ -16934,7 +18775,7 @@
     </p:spTree>
     <p:extLst>
       <p:ext uri="{BB962C8B-B14F-4D97-AF65-F5344CB8AC3E}">
-        <p14:creationId xmlns:p14="http://schemas.microsoft.com/office/powerpoint/2010/main" val="941066589"/>
+        <p14:creationId xmlns:p14="http://schemas.microsoft.com/office/powerpoint/2010/main" val="3458892955"/>
       </p:ext>
     </p:extLst>
   </p:cSld>
@@ -16944,7 +18785,7 @@
 </p:sld>
 </file>
 
-<file path=ppt/slides/slide5.xml><?xml version="1.0" encoding="utf-8"?>
+<file path=ppt/slides/slide9.xml><?xml version="1.0" encoding="utf-8"?>
 <p:sld xmlns:a="http://schemas.openxmlformats.org/drawingml/2006/main" xmlns:r="http://schemas.openxmlformats.org/officeDocument/2006/relationships" xmlns:p="http://schemas.openxmlformats.org/presentationml/2006/main">
   <p:cSld>
     <p:spTree>
@@ -16987,7 +18828,24 @@
           <a:bodyPr/>
           <a:lstStyle/>
           <a:p>
-            <a:endParaRPr lang="en-US" dirty="0"/>
+            <a:r>
+              <a:rPr lang="en-US" sz="3200" dirty="0"/>
+              <a:t>Using source control should be table stakes</a:t>
+            </a:r>
+          </a:p>
+          <a:p>
+            <a:pPr lvl="1"/>
+            <a:r>
+              <a:rPr lang="en-US" sz="2800" dirty="0"/>
+              <a:t>Not using it is like still clicking through GUI wizards instead of scripting</a:t>
+            </a:r>
+          </a:p>
+          <a:p>
+            <a:pPr lvl="1"/>
+            <a:r>
+              <a:rPr lang="en-US" sz="2800" dirty="0"/>
+              <a:t>Git, TFVC, subversion, whatever</a:t>
+            </a:r>
           </a:p>
         </p:txBody>
       </p:sp>
@@ -17050,7 +18908,7 @@
                   <a:lin ang="0" scaled="0"/>
                 </a:gradFill>
               </a:rPr>
-              <a:t>Agenda</a:t>
+              <a:t>Source Control</a:t>
             </a:r>
           </a:p>
         </p:txBody>
@@ -17058,300 +18916,7 @@
     </p:spTree>
     <p:extLst>
       <p:ext uri="{BB962C8B-B14F-4D97-AF65-F5344CB8AC3E}">
-        <p14:creationId xmlns:p14="http://schemas.microsoft.com/office/powerpoint/2010/main" val="3458892955"/>
-      </p:ext>
-    </p:extLst>
-  </p:cSld>
-  <p:clrMapOvr>
-    <a:masterClrMapping/>
-  </p:clrMapOvr>
-</p:sld>
-</file>
-
-<file path=ppt/slides/slide6.xml><?xml version="1.0" encoding="utf-8"?>
-<p:sld xmlns:a="http://schemas.openxmlformats.org/drawingml/2006/main" xmlns:r="http://schemas.openxmlformats.org/officeDocument/2006/relationships" xmlns:p="http://schemas.openxmlformats.org/presentationml/2006/main">
-  <p:cSld>
-    <p:spTree>
-      <p:nvGrpSpPr>
-        <p:cNvPr id="1" name=""/>
-        <p:cNvGrpSpPr/>
-        <p:nvPr/>
-      </p:nvGrpSpPr>
-      <p:grpSpPr>
-        <a:xfrm>
-          <a:off x="0" y="0"/>
-          <a:ext cx="0" cy="0"/>
-          <a:chOff x="0" y="0"/>
-          <a:chExt cx="0" cy="0"/>
-        </a:xfrm>
-      </p:grpSpPr>
-      <p:sp>
-        <p:nvSpPr>
-          <p:cNvPr id="2" name="TextBox 1">
-            <a:extLst>
-              <a:ext uri="{FF2B5EF4-FFF2-40B4-BE49-F238E27FC236}">
-                <a16:creationId xmlns:a16="http://schemas.microsoft.com/office/drawing/2014/main" id="{ED95610F-322B-4DD1-8AA0-F9773EDD4C17}"/>
-              </a:ext>
-            </a:extLst>
-          </p:cNvPr>
-          <p:cNvSpPr txBox="1"/>
-          <p:nvPr/>
-        </p:nvSpPr>
-        <p:spPr>
-          <a:xfrm>
-            <a:off x="1411586" y="411451"/>
-            <a:ext cx="9368828" cy="2015936"/>
-          </a:xfrm>
-          <a:prstGeom prst="rect">
-            <a:avLst/>
-          </a:prstGeom>
-          <a:noFill/>
-        </p:spPr>
-        <p:txBody>
-          <a:bodyPr wrap="square" rtlCol="0">
-            <a:spAutoFit/>
-          </a:bodyPr>
-          <a:lstStyle>
-            <a:defPPr>
-              <a:defRPr lang="en-US"/>
-            </a:defPPr>
-            <a:lvl1pPr algn="ctr">
-              <a:tabLst>
-                <a:tab pos="3835400" algn="l"/>
-              </a:tabLst>
-              <a:defRPr sz="18000" b="1">
-                <a:solidFill>
-                  <a:schemeClr val="bg1"/>
-                </a:solidFill>
-                <a:latin typeface="Space Grotesk" pitchFamily="2" charset="0"/>
-                <a:cs typeface="Space Grotesk" pitchFamily="2" charset="0"/>
-              </a:defRPr>
-            </a:lvl1pPr>
-          </a:lstStyle>
-          <a:p>
-            <a:r>
-              <a:rPr lang="en-US" sz="12500" dirty="0">
-                <a:gradFill>
-                  <a:gsLst>
-                    <a:gs pos="0">
-                      <a:schemeClr val="accent1"/>
-                    </a:gs>
-                    <a:gs pos="100000">
-                      <a:schemeClr val="accent2"/>
-                    </a:gs>
-                  </a:gsLst>
-                  <a:lin ang="0" scaled="0"/>
-                </a:gradFill>
-              </a:rPr>
-              <a:t>THANK YOU</a:t>
-            </a:r>
-          </a:p>
-        </p:txBody>
-      </p:sp>
-      <p:sp>
-        <p:nvSpPr>
-          <p:cNvPr id="7" name="TextBox 6">
-            <a:extLst>
-              <a:ext uri="{FF2B5EF4-FFF2-40B4-BE49-F238E27FC236}">
-                <a16:creationId xmlns:a16="http://schemas.microsoft.com/office/drawing/2014/main" id="{243C9207-59EB-04DC-C4D8-A685A328FC4D}"/>
-              </a:ext>
-            </a:extLst>
-          </p:cNvPr>
-          <p:cNvSpPr txBox="1"/>
-          <p:nvPr/>
-        </p:nvSpPr>
-        <p:spPr>
-          <a:xfrm>
-            <a:off x="3363958" y="2333592"/>
-            <a:ext cx="5290495" cy="432041"/>
-          </a:xfrm>
-          <a:prstGeom prst="rect">
-            <a:avLst/>
-          </a:prstGeom>
-          <a:noFill/>
-        </p:spPr>
-        <p:txBody>
-          <a:bodyPr wrap="square" rtlCol="0">
-            <a:spAutoFit/>
-          </a:bodyPr>
-          <a:lstStyle/>
-          <a:p>
-            <a:pPr algn="ctr">
-              <a:lnSpc>
-                <a:spcPts val="2800"/>
-              </a:lnSpc>
-            </a:pPr>
-            <a:r>
-              <a:rPr lang="en-US" sz="2000" b="1" spc="400" dirty="0">
-                <a:solidFill>
-                  <a:schemeClr val="bg1"/>
-                </a:solidFill>
-                <a:latin typeface="Play" panose="00000500000000000000" pitchFamily="2" charset="0"/>
-                <a:cs typeface="Space Grotesk" pitchFamily="2" charset="0"/>
-              </a:rPr>
-              <a:t>Please review this session</a:t>
-            </a:r>
-          </a:p>
-        </p:txBody>
-      </p:sp>
-      <p:pic>
-        <p:nvPicPr>
-          <p:cNvPr id="6" name="Picture 5" descr="A qr code on a screen&#10;&#10;Description automatically generated">
-            <a:extLst>
-              <a:ext uri="{FF2B5EF4-FFF2-40B4-BE49-F238E27FC236}">
-                <a16:creationId xmlns:a16="http://schemas.microsoft.com/office/drawing/2014/main" id="{8F760940-8BAB-7607-94F5-F5264399088D}"/>
-              </a:ext>
-            </a:extLst>
-          </p:cNvPr>
-          <p:cNvPicPr>
-            <a:picLocks noChangeAspect="1"/>
-          </p:cNvPicPr>
-          <p:nvPr/>
-        </p:nvPicPr>
-        <p:blipFill>
-          <a:blip r:embed="rId2"/>
-          <a:stretch>
-            <a:fillRect/>
-          </a:stretch>
-        </p:blipFill>
-        <p:spPr>
-          <a:xfrm>
-            <a:off x="4996915" y="3416968"/>
-            <a:ext cx="2198170" cy="2930893"/>
-          </a:xfrm>
-          <a:prstGeom prst="rect">
-            <a:avLst/>
-          </a:prstGeom>
-        </p:spPr>
-      </p:pic>
-    </p:spTree>
-    <p:extLst>
-      <p:ext uri="{BB962C8B-B14F-4D97-AF65-F5344CB8AC3E}">
-        <p14:creationId xmlns:p14="http://schemas.microsoft.com/office/powerpoint/2010/main" val="194438742"/>
-      </p:ext>
-    </p:extLst>
-  </p:cSld>
-  <p:clrMapOvr>
-    <a:masterClrMapping/>
-  </p:clrMapOvr>
-</p:sld>
-</file>
-
-<file path=ppt/slides/slide7.xml><?xml version="1.0" encoding="utf-8"?>
-<p:sld xmlns:a="http://schemas.openxmlformats.org/drawingml/2006/main" xmlns:r="http://schemas.openxmlformats.org/officeDocument/2006/relationships" xmlns:p="http://schemas.openxmlformats.org/presentationml/2006/main">
-  <p:cSld>
-    <p:spTree>
-      <p:nvGrpSpPr>
-        <p:cNvPr id="1" name=""/>
-        <p:cNvGrpSpPr/>
-        <p:nvPr/>
-      </p:nvGrpSpPr>
-      <p:grpSpPr>
-        <a:xfrm>
-          <a:off x="0" y="0"/>
-          <a:ext cx="0" cy="0"/>
-          <a:chOff x="0" y="0"/>
-          <a:chExt cx="0" cy="0"/>
-        </a:xfrm>
-      </p:grpSpPr>
-      <p:sp>
-        <p:nvSpPr>
-          <p:cNvPr id="4" name="Text Placeholder 3">
-            <a:extLst>
-              <a:ext uri="{FF2B5EF4-FFF2-40B4-BE49-F238E27FC236}">
-                <a16:creationId xmlns:a16="http://schemas.microsoft.com/office/drawing/2014/main" id="{9E69EAED-464E-BBBF-03FD-FD2E1A0F0824}"/>
-              </a:ext>
-            </a:extLst>
-          </p:cNvPr>
-          <p:cNvSpPr>
-            <a:spLocks noGrp="1"/>
-          </p:cNvSpPr>
-          <p:nvPr>
-            <p:ph type="body" sz="quarter" idx="10"/>
-          </p:nvPr>
-        </p:nvSpPr>
-        <p:spPr>
-          <a:xfrm>
-            <a:off x="1362375" y="1992193"/>
-            <a:ext cx="9903723" cy="3986576"/>
-          </a:xfrm>
-        </p:spPr>
-        <p:txBody>
-          <a:bodyPr/>
-          <a:lstStyle/>
-          <a:p>
-            <a:endParaRPr lang="en-US" dirty="0"/>
-          </a:p>
-        </p:txBody>
-      </p:sp>
-      <p:sp>
-        <p:nvSpPr>
-          <p:cNvPr id="5" name="TextBox 4">
-            <a:extLst>
-              <a:ext uri="{FF2B5EF4-FFF2-40B4-BE49-F238E27FC236}">
-                <a16:creationId xmlns:a16="http://schemas.microsoft.com/office/drawing/2014/main" id="{DDC53EED-D8A2-EFE1-6513-7970D2E231E3}"/>
-              </a:ext>
-            </a:extLst>
-          </p:cNvPr>
-          <p:cNvSpPr txBox="1"/>
-          <p:nvPr/>
-        </p:nvSpPr>
-        <p:spPr>
-          <a:xfrm>
-            <a:off x="1411586" y="879231"/>
-            <a:ext cx="9368828" cy="830997"/>
-          </a:xfrm>
-          <a:prstGeom prst="rect">
-            <a:avLst/>
-          </a:prstGeom>
-          <a:noFill/>
-        </p:spPr>
-        <p:txBody>
-          <a:bodyPr wrap="square" rtlCol="0">
-            <a:spAutoFit/>
-          </a:bodyPr>
-          <a:lstStyle>
-            <a:defPPr>
-              <a:defRPr lang="en-US"/>
-            </a:defPPr>
-            <a:lvl1pPr algn="ctr">
-              <a:tabLst>
-                <a:tab pos="3835400" algn="l"/>
-              </a:tabLst>
-              <a:defRPr sz="18000" b="1">
-                <a:solidFill>
-                  <a:schemeClr val="bg1"/>
-                </a:solidFill>
-                <a:latin typeface="Space Grotesk" pitchFamily="2" charset="0"/>
-                <a:cs typeface="Space Grotesk" pitchFamily="2" charset="0"/>
-              </a:defRPr>
-            </a:lvl1pPr>
-          </a:lstStyle>
-          <a:p>
-            <a:pPr algn="l"/>
-            <a:r>
-              <a:rPr lang="en-US" sz="4800" dirty="0">
-                <a:gradFill>
-                  <a:gsLst>
-                    <a:gs pos="0">
-                      <a:schemeClr val="accent1"/>
-                    </a:gs>
-                    <a:gs pos="100000">
-                      <a:schemeClr val="accent2"/>
-                    </a:gs>
-                  </a:gsLst>
-                  <a:lin ang="0" scaled="0"/>
-                </a:gradFill>
-              </a:rPr>
-              <a:t>Heading</a:t>
-            </a:r>
-          </a:p>
-        </p:txBody>
-      </p:sp>
-    </p:spTree>
-    <p:extLst>
-      <p:ext uri="{BB962C8B-B14F-4D97-AF65-F5344CB8AC3E}">
-        <p14:creationId xmlns:p14="http://schemas.microsoft.com/office/powerpoint/2010/main" val="1764268837"/>
+        <p14:creationId xmlns:p14="http://schemas.microsoft.com/office/powerpoint/2010/main" val="2463384963"/>
       </p:ext>
     </p:extLst>
   </p:cSld>

</xml_diff>